<commit_message>
EST-1146: updates to .pptx on attachments, for conversation
</commit_message>
<xml_diff>
--- a/docs/docs-and-comms/attachments.pptx
+++ b/docs/docs-and-comms/attachments.pptx
@@ -11,10 +11,17 @@
     <p:sldId id="262" r:id="rId5"/>
     <p:sldId id="264" r:id="rId6"/>
     <p:sldId id="263" r:id="rId7"/>
-    <p:sldId id="267" r:id="rId8"/>
-    <p:sldId id="266" r:id="rId9"/>
-    <p:sldId id="257" r:id="rId10"/>
-    <p:sldId id="259" r:id="rId11"/>
+    <p:sldId id="276" r:id="rId8"/>
+    <p:sldId id="267" r:id="rId9"/>
+    <p:sldId id="266" r:id="rId10"/>
+    <p:sldId id="257" r:id="rId11"/>
+    <p:sldId id="259" r:id="rId12"/>
+    <p:sldId id="275" r:id="rId13"/>
+    <p:sldId id="272" r:id="rId14"/>
+    <p:sldId id="273" r:id="rId15"/>
+    <p:sldId id="274" r:id="rId16"/>
+    <p:sldId id="270" r:id="rId17"/>
+    <p:sldId id="271" r:id="rId18"/>
   </p:sldIdLst>
   <p:sldSz cx="9144000" cy="6858000" type="screen4x3"/>
   <p:notesSz cx="6858000" cy="9144000"/>
@@ -132,10 +139,21 @@
         </p14:section>
         <p14:section name="Untitled Section" id="{2A937E11-21D7-4543-B15D-3CE9239F3BB7}">
           <p14:sldIdLst>
+            <p14:sldId id="276"/>
             <p14:sldId id="267"/>
             <p14:sldId id="266"/>
             <p14:sldId id="257"/>
             <p14:sldId id="259"/>
+          </p14:sldIdLst>
+        </p14:section>
+        <p14:section name="Untitled Section" id="{BC998809-CCBC-4302-9582-D1EF2F160D19}">
+          <p14:sldIdLst>
+            <p14:sldId id="275"/>
+            <p14:sldId id="272"/>
+            <p14:sldId id="273"/>
+            <p14:sldId id="274"/>
+            <p14:sldId id="270"/>
+            <p14:sldId id="271"/>
           </p14:sldIdLst>
         </p14:section>
       </p14:sectionLst>
@@ -325,7 +343,7 @@
           <a:p>
             <a:fld id="{C1D19C46-83CA-4F9A-95E6-7D0892390C8A}" type="datetimeFigureOut">
               <a:rPr lang="en-GB" smtClean="0"/>
-              <a:t>01/03/2017</a:t>
+              <a:t>03/03/2017</a:t>
             </a:fld>
             <a:endParaRPr lang="en-GB"/>
           </a:p>
@@ -495,7 +513,7 @@
           <a:p>
             <a:fld id="{C1D19C46-83CA-4F9A-95E6-7D0892390C8A}" type="datetimeFigureOut">
               <a:rPr lang="en-GB" smtClean="0"/>
-              <a:t>01/03/2017</a:t>
+              <a:t>03/03/2017</a:t>
             </a:fld>
             <a:endParaRPr lang="en-GB"/>
           </a:p>
@@ -675,7 +693,7 @@
           <a:p>
             <a:fld id="{C1D19C46-83CA-4F9A-95E6-7D0892390C8A}" type="datetimeFigureOut">
               <a:rPr lang="en-GB" smtClean="0"/>
-              <a:t>01/03/2017</a:t>
+              <a:t>03/03/2017</a:t>
             </a:fld>
             <a:endParaRPr lang="en-GB"/>
           </a:p>
@@ -845,7 +863,7 @@
           <a:p>
             <a:fld id="{C1D19C46-83CA-4F9A-95E6-7D0892390C8A}" type="datetimeFigureOut">
               <a:rPr lang="en-GB" smtClean="0"/>
-              <a:t>01/03/2017</a:t>
+              <a:t>03/03/2017</a:t>
             </a:fld>
             <a:endParaRPr lang="en-GB"/>
           </a:p>
@@ -1091,7 +1109,7 @@
           <a:p>
             <a:fld id="{C1D19C46-83CA-4F9A-95E6-7D0892390C8A}" type="datetimeFigureOut">
               <a:rPr lang="en-GB" smtClean="0"/>
-              <a:t>01/03/2017</a:t>
+              <a:t>03/03/2017</a:t>
             </a:fld>
             <a:endParaRPr lang="en-GB"/>
           </a:p>
@@ -1379,7 +1397,7 @@
           <a:p>
             <a:fld id="{C1D19C46-83CA-4F9A-95E6-7D0892390C8A}" type="datetimeFigureOut">
               <a:rPr lang="en-GB" smtClean="0"/>
-              <a:t>01/03/2017</a:t>
+              <a:t>03/03/2017</a:t>
             </a:fld>
             <a:endParaRPr lang="en-GB"/>
           </a:p>
@@ -1801,7 +1819,7 @@
           <a:p>
             <a:fld id="{C1D19C46-83CA-4F9A-95E6-7D0892390C8A}" type="datetimeFigureOut">
               <a:rPr lang="en-GB" smtClean="0"/>
-              <a:t>01/03/2017</a:t>
+              <a:t>03/03/2017</a:t>
             </a:fld>
             <a:endParaRPr lang="en-GB"/>
           </a:p>
@@ -1919,7 +1937,7 @@
           <a:p>
             <a:fld id="{C1D19C46-83CA-4F9A-95E6-7D0892390C8A}" type="datetimeFigureOut">
               <a:rPr lang="en-GB" smtClean="0"/>
-              <a:t>01/03/2017</a:t>
+              <a:t>03/03/2017</a:t>
             </a:fld>
             <a:endParaRPr lang="en-GB"/>
           </a:p>
@@ -2014,7 +2032,7 @@
           <a:p>
             <a:fld id="{C1D19C46-83CA-4F9A-95E6-7D0892390C8A}" type="datetimeFigureOut">
               <a:rPr lang="en-GB" smtClean="0"/>
-              <a:t>01/03/2017</a:t>
+              <a:t>03/03/2017</a:t>
             </a:fld>
             <a:endParaRPr lang="en-GB"/>
           </a:p>
@@ -2291,7 +2309,7 @@
           <a:p>
             <a:fld id="{C1D19C46-83CA-4F9A-95E6-7D0892390C8A}" type="datetimeFigureOut">
               <a:rPr lang="en-GB" smtClean="0"/>
-              <a:t>01/03/2017</a:t>
+              <a:t>03/03/2017</a:t>
             </a:fld>
             <a:endParaRPr lang="en-GB"/>
           </a:p>
@@ -2544,7 +2562,7 @@
           <a:p>
             <a:fld id="{C1D19C46-83CA-4F9A-95E6-7D0892390C8A}" type="datetimeFigureOut">
               <a:rPr lang="en-GB" smtClean="0"/>
-              <a:t>01/03/2017</a:t>
+              <a:t>03/03/2017</a:t>
             </a:fld>
             <a:endParaRPr lang="en-GB"/>
           </a:p>
@@ -2757,7 +2775,7 @@
           <a:p>
             <a:fld id="{C1D19C46-83CA-4F9A-95E6-7D0892390C8A}" type="datetimeFigureOut">
               <a:rPr lang="en-GB" smtClean="0"/>
-              <a:t>01/03/2017</a:t>
+              <a:t>03/03/2017</a:t>
             </a:fld>
             <a:endParaRPr lang="en-GB"/>
           </a:p>
@@ -3913,6 +3931,699 @@
           <a:p>
             <a:r>
               <a:rPr lang="en-GB" dirty="0" smtClean="0"/>
+              <a:t>(Post)</a:t>
+            </a:r>
+          </a:p>
+          <a:p>
+            <a:r>
+              <a:rPr lang="en-GB" dirty="0" smtClean="0"/>
+              <a:t>Communication</a:t>
+            </a:r>
+            <a:endParaRPr lang="en-GB" dirty="0"/>
+          </a:p>
+        </p:txBody>
+      </p:sp>
+      <p:pic>
+        <p:nvPicPr>
+          <p:cNvPr id="27" name="Picture 4" descr="C:\GITHUB\incodehq\incode-module-document\dom\src\main\java\org\incode\module\document\dom\impl\paperclips\Paperclip.png"/>
+          <p:cNvPicPr>
+            <a:picLocks noChangeAspect="1" noChangeArrowheads="1"/>
+          </p:cNvPicPr>
+          <p:nvPr/>
+        </p:nvPicPr>
+        <p:blipFill>
+          <a:blip r:embed="rId4">
+            <a:extLst>
+              <a:ext uri="{28A0092B-C50C-407E-A947-70E740481C1C}">
+                <a14:useLocalDpi xmlns:a14="http://schemas.microsoft.com/office/drawing/2010/main" val="0"/>
+              </a:ext>
+            </a:extLst>
+          </a:blip>
+          <a:srcRect/>
+          <a:stretch>
+            <a:fillRect/>
+          </a:stretch>
+        </p:blipFill>
+        <p:spPr bwMode="auto">
+          <a:xfrm>
+            <a:off x="4460367" y="2766119"/>
+            <a:ext cx="518865" cy="518865"/>
+          </a:xfrm>
+          <a:prstGeom prst="rect">
+            <a:avLst/>
+          </a:prstGeom>
+          <a:noFill/>
+          <a:extLst>
+            <a:ext uri="{909E8E84-426E-40DD-AFC4-6F175D3DCCD1}">
+              <a14:hiddenFill xmlns:a14="http://schemas.microsoft.com/office/drawing/2010/main">
+                <a:solidFill>
+                  <a:srgbClr val="FFFFFF"/>
+                </a:solidFill>
+              </a14:hiddenFill>
+            </a:ext>
+          </a:extLst>
+        </p:spPr>
+      </p:pic>
+      <p:cxnSp>
+        <p:nvCxnSpPr>
+          <p:cNvPr id="29" name="Straight Connector 28"/>
+          <p:cNvCxnSpPr/>
+          <p:nvPr/>
+        </p:nvCxnSpPr>
+        <p:spPr>
+          <a:xfrm>
+            <a:off x="1227230" y="1539961"/>
+            <a:ext cx="1048898" cy="1015011"/>
+          </a:xfrm>
+          <a:prstGeom prst="line">
+            <a:avLst/>
+          </a:prstGeom>
+        </p:spPr>
+        <p:style>
+          <a:lnRef idx="1">
+            <a:schemeClr val="accent1"/>
+          </a:lnRef>
+          <a:fillRef idx="0">
+            <a:schemeClr val="accent1"/>
+          </a:fillRef>
+          <a:effectRef idx="0">
+            <a:schemeClr val="accent1"/>
+          </a:effectRef>
+          <a:fontRef idx="minor">
+            <a:schemeClr val="tx1"/>
+          </a:fontRef>
+        </p:style>
+      </p:cxnSp>
+      <p:cxnSp>
+        <p:nvCxnSpPr>
+          <p:cNvPr id="30" name="Straight Connector 29"/>
+          <p:cNvCxnSpPr/>
+          <p:nvPr/>
+        </p:nvCxnSpPr>
+        <p:spPr>
+          <a:xfrm>
+            <a:off x="3380247" y="3004718"/>
+            <a:ext cx="3096344" cy="26167"/>
+          </a:xfrm>
+          <a:prstGeom prst="line">
+            <a:avLst/>
+          </a:prstGeom>
+        </p:spPr>
+        <p:style>
+          <a:lnRef idx="1">
+            <a:schemeClr val="accent1"/>
+          </a:lnRef>
+          <a:fillRef idx="0">
+            <a:schemeClr val="accent1"/>
+          </a:fillRef>
+          <a:effectRef idx="0">
+            <a:schemeClr val="accent1"/>
+          </a:effectRef>
+          <a:fontRef idx="minor">
+            <a:schemeClr val="tx1"/>
+          </a:fontRef>
+        </p:style>
+      </p:cxnSp>
+      <p:pic>
+        <p:nvPicPr>
+          <p:cNvPr id="25" name="Picture 4" descr="C:\GITHUB\incodehq\incode-module-document\dom\src\main\java\org\incode\module\document\dom\impl\paperclips\Paperclip.png"/>
+          <p:cNvPicPr>
+            <a:picLocks noChangeAspect="1" noChangeArrowheads="1"/>
+          </p:cNvPicPr>
+          <p:nvPr/>
+        </p:nvPicPr>
+        <p:blipFill>
+          <a:blip r:embed="rId4">
+            <a:extLst>
+              <a:ext uri="{28A0092B-C50C-407E-A947-70E740481C1C}">
+                <a14:useLocalDpi xmlns:a14="http://schemas.microsoft.com/office/drawing/2010/main" val="0"/>
+              </a:ext>
+            </a:extLst>
+          </a:blip>
+          <a:srcRect/>
+          <a:stretch>
+            <a:fillRect/>
+          </a:stretch>
+        </p:blipFill>
+        <p:spPr bwMode="auto">
+          <a:xfrm>
+            <a:off x="3596601" y="4206279"/>
+            <a:ext cx="518865" cy="518865"/>
+          </a:xfrm>
+          <a:prstGeom prst="rect">
+            <a:avLst/>
+          </a:prstGeom>
+          <a:noFill/>
+          <a:extLst>
+            <a:ext uri="{909E8E84-426E-40DD-AFC4-6F175D3DCCD1}">
+              <a14:hiddenFill xmlns:a14="http://schemas.microsoft.com/office/drawing/2010/main">
+                <a:solidFill>
+                  <a:srgbClr val="FFFFFF"/>
+                </a:solidFill>
+              </a14:hiddenFill>
+            </a:ext>
+          </a:extLst>
+        </p:spPr>
+      </p:pic>
+      <p:cxnSp>
+        <p:nvCxnSpPr>
+          <p:cNvPr id="31" name="Straight Connector 30"/>
+          <p:cNvCxnSpPr/>
+          <p:nvPr/>
+        </p:nvCxnSpPr>
+        <p:spPr>
+          <a:xfrm flipV="1">
+            <a:off x="2053048" y="3337233"/>
+            <a:ext cx="4391160" cy="1890007"/>
+          </a:xfrm>
+          <a:prstGeom prst="line">
+            <a:avLst/>
+          </a:prstGeom>
+        </p:spPr>
+        <p:style>
+          <a:lnRef idx="1">
+            <a:schemeClr val="accent1"/>
+          </a:lnRef>
+          <a:fillRef idx="0">
+            <a:schemeClr val="accent1"/>
+          </a:fillRef>
+          <a:effectRef idx="0">
+            <a:schemeClr val="accent1"/>
+          </a:effectRef>
+          <a:fontRef idx="minor">
+            <a:schemeClr val="tx1"/>
+          </a:fontRef>
+        </p:style>
+      </p:cxnSp>
+      <p:sp>
+        <p:nvSpPr>
+          <p:cNvPr id="32" name="TextBox 31"/>
+          <p:cNvSpPr txBox="1"/>
+          <p:nvPr/>
+        </p:nvSpPr>
+        <p:spPr>
+          <a:xfrm>
+            <a:off x="3203848" y="188640"/>
+            <a:ext cx="2973250" cy="646331"/>
+          </a:xfrm>
+          <a:prstGeom prst="rect">
+            <a:avLst/>
+          </a:prstGeom>
+          <a:noFill/>
+        </p:spPr>
+        <p:txBody>
+          <a:bodyPr wrap="none" rtlCol="0">
+            <a:spAutoFit/>
+          </a:bodyPr>
+          <a:lstStyle/>
+          <a:p>
+            <a:r>
+              <a:rPr lang="en-GB" sz="3600" dirty="0" smtClean="0">
+                <a:solidFill>
+                  <a:srgbClr val="00B050"/>
+                </a:solidFill>
+              </a:rPr>
+              <a:t>“Send by Post”</a:t>
+            </a:r>
+            <a:endParaRPr lang="en-GB" sz="3600" dirty="0">
+              <a:solidFill>
+                <a:srgbClr val="00B050"/>
+              </a:solidFill>
+            </a:endParaRPr>
+          </a:p>
+        </p:txBody>
+      </p:sp>
+    </p:spTree>
+    <p:extLst>
+      <p:ext uri="{BB962C8B-B14F-4D97-AF65-F5344CB8AC3E}">
+        <p14:creationId xmlns:p14="http://schemas.microsoft.com/office/powerpoint/2010/main" val="3079389626"/>
+      </p:ext>
+    </p:extLst>
+  </p:cSld>
+  <p:clrMapOvr>
+    <a:masterClrMapping/>
+  </p:clrMapOvr>
+  <p:timing>
+    <p:tnLst>
+      <p:par>
+        <p:cTn id="1" dur="indefinite" restart="never" nodeType="tmRoot"/>
+      </p:par>
+    </p:tnLst>
+  </p:timing>
+</p:sld>
+</file>
+
+<file path=ppt/slides/slide11.xml><?xml version="1.0" encoding="utf-8"?>
+<p:sld xmlns:a="http://schemas.openxmlformats.org/drawingml/2006/main" xmlns:r="http://schemas.openxmlformats.org/officeDocument/2006/relationships" xmlns:p="http://schemas.openxmlformats.org/presentationml/2006/main">
+  <p:cSld>
+    <p:spTree>
+      <p:nvGrpSpPr>
+        <p:cNvPr id="1" name=""/>
+        <p:cNvGrpSpPr/>
+        <p:nvPr/>
+      </p:nvGrpSpPr>
+      <p:grpSpPr>
+        <a:xfrm>
+          <a:off x="0" y="0"/>
+          <a:ext cx="0" cy="0"/>
+          <a:chOff x="0" y="0"/>
+          <a:chExt cx="0" cy="0"/>
+        </a:xfrm>
+      </p:grpSpPr>
+      <p:pic>
+        <p:nvPicPr>
+          <p:cNvPr id="1026" name="Picture 2" descr="C:\GITHUB\estatio\estatio\estatioapp\module\invoice\dom\src\main\java\org\estatio\dom\invoice\Invoice.png"/>
+          <p:cNvPicPr>
+            <a:picLocks noChangeAspect="1" noChangeArrowheads="1"/>
+          </p:cNvPicPr>
+          <p:nvPr/>
+        </p:nvPicPr>
+        <p:blipFill>
+          <a:blip r:embed="rId2">
+            <a:extLst>
+              <a:ext uri="{28A0092B-C50C-407E-A947-70E740481C1C}">
+                <a14:useLocalDpi xmlns:a14="http://schemas.microsoft.com/office/drawing/2010/main" val="0"/>
+              </a:ext>
+            </a:extLst>
+          </a:blip>
+          <a:srcRect/>
+          <a:stretch>
+            <a:fillRect/>
+          </a:stretch>
+        </p:blipFill>
+        <p:spPr bwMode="auto">
+          <a:xfrm>
+            <a:off x="211895" y="332656"/>
+            <a:ext cx="916260" cy="916260"/>
+          </a:xfrm>
+          <a:prstGeom prst="rect">
+            <a:avLst/>
+          </a:prstGeom>
+          <a:noFill/>
+          <a:extLst>
+            <a:ext uri="{909E8E84-426E-40DD-AFC4-6F175D3DCCD1}">
+              <a14:hiddenFill xmlns:a14="http://schemas.microsoft.com/office/drawing/2010/main">
+                <a:solidFill>
+                  <a:srgbClr val="FFFFFF"/>
+                </a:solidFill>
+              </a14:hiddenFill>
+            </a:ext>
+          </a:extLst>
+        </p:spPr>
+      </p:pic>
+      <p:sp>
+        <p:nvSpPr>
+          <p:cNvPr id="9" name="TextBox 8"/>
+          <p:cNvSpPr txBox="1"/>
+          <p:nvPr/>
+        </p:nvSpPr>
+        <p:spPr>
+          <a:xfrm>
+            <a:off x="1140729" y="332656"/>
+            <a:ext cx="850361" cy="369332"/>
+          </a:xfrm>
+          <a:prstGeom prst="rect">
+            <a:avLst/>
+          </a:prstGeom>
+          <a:noFill/>
+        </p:spPr>
+        <p:txBody>
+          <a:bodyPr wrap="none" rtlCol="0">
+            <a:spAutoFit/>
+          </a:bodyPr>
+          <a:lstStyle/>
+          <a:p>
+            <a:r>
+              <a:rPr lang="en-GB" dirty="0" smtClean="0"/>
+              <a:t>Invoice</a:t>
+            </a:r>
+            <a:endParaRPr lang="en-GB" dirty="0"/>
+          </a:p>
+        </p:txBody>
+      </p:sp>
+      <p:pic>
+        <p:nvPicPr>
+          <p:cNvPr id="1027" name="Picture 3" descr="C:\GITHUB\incodehq\incode-module-document\dom\src\main\java\org\incode\module\document\dom\impl\docs\Document-pdf.png"/>
+          <p:cNvPicPr>
+            <a:picLocks noChangeAspect="1" noChangeArrowheads="1"/>
+          </p:cNvPicPr>
+          <p:nvPr/>
+        </p:nvPicPr>
+        <p:blipFill>
+          <a:blip r:embed="rId3">
+            <a:extLst>
+              <a:ext uri="{28A0092B-C50C-407E-A947-70E740481C1C}">
+                <a14:useLocalDpi xmlns:a14="http://schemas.microsoft.com/office/drawing/2010/main" val="0"/>
+              </a:ext>
+            </a:extLst>
+          </a:blip>
+          <a:srcRect/>
+          <a:stretch>
+            <a:fillRect/>
+          </a:stretch>
+        </p:blipFill>
+        <p:spPr bwMode="auto">
+          <a:xfrm>
+            <a:off x="2363960" y="2546588"/>
+            <a:ext cx="916260" cy="916260"/>
+          </a:xfrm>
+          <a:prstGeom prst="rect">
+            <a:avLst/>
+          </a:prstGeom>
+          <a:noFill/>
+          <a:extLst>
+            <a:ext uri="{909E8E84-426E-40DD-AFC4-6F175D3DCCD1}">
+              <a14:hiddenFill xmlns:a14="http://schemas.microsoft.com/office/drawing/2010/main">
+                <a:solidFill>
+                  <a:srgbClr val="FFFFFF"/>
+                </a:solidFill>
+              </a14:hiddenFill>
+            </a:ext>
+          </a:extLst>
+        </p:spPr>
+      </p:pic>
+      <p:sp>
+        <p:nvSpPr>
+          <p:cNvPr id="12" name="TextBox 11"/>
+          <p:cNvSpPr txBox="1"/>
+          <p:nvPr/>
+        </p:nvSpPr>
+        <p:spPr>
+          <a:xfrm>
+            <a:off x="2372135" y="3484433"/>
+            <a:ext cx="1165191" cy="646331"/>
+          </a:xfrm>
+          <a:prstGeom prst="rect">
+            <a:avLst/>
+          </a:prstGeom>
+          <a:noFill/>
+        </p:spPr>
+        <p:txBody>
+          <a:bodyPr wrap="none" rtlCol="0">
+            <a:spAutoFit/>
+          </a:bodyPr>
+          <a:lstStyle/>
+          <a:p>
+            <a:r>
+              <a:rPr lang="en-GB" dirty="0" smtClean="0"/>
+              <a:t>(Invoice)</a:t>
+            </a:r>
+          </a:p>
+          <a:p>
+            <a:r>
+              <a:rPr lang="en-GB" dirty="0" smtClean="0"/>
+              <a:t>Document</a:t>
+            </a:r>
+            <a:endParaRPr lang="en-GB" dirty="0"/>
+          </a:p>
+        </p:txBody>
+      </p:sp>
+      <p:pic>
+        <p:nvPicPr>
+          <p:cNvPr id="13" name="Picture 3" descr="C:\GITHUB\incodehq\incode-module-document\dom\src\main\java\org\incode\module\document\dom\impl\docs\Document-pdf.png"/>
+          <p:cNvPicPr>
+            <a:picLocks noChangeAspect="1" noChangeArrowheads="1"/>
+          </p:cNvPicPr>
+          <p:nvPr/>
+        </p:nvPicPr>
+        <p:blipFill>
+          <a:blip r:embed="rId3">
+            <a:extLst>
+              <a:ext uri="{28A0092B-C50C-407E-A947-70E740481C1C}">
+                <a14:useLocalDpi xmlns:a14="http://schemas.microsoft.com/office/drawing/2010/main" val="0"/>
+              </a:ext>
+            </a:extLst>
+          </a:blip>
+          <a:srcRect/>
+          <a:stretch>
+            <a:fillRect/>
+          </a:stretch>
+        </p:blipFill>
+        <p:spPr bwMode="auto">
+          <a:xfrm>
+            <a:off x="827584" y="4785735"/>
+            <a:ext cx="916260" cy="916260"/>
+          </a:xfrm>
+          <a:prstGeom prst="rect">
+            <a:avLst/>
+          </a:prstGeom>
+          <a:noFill/>
+          <a:extLst>
+            <a:ext uri="{909E8E84-426E-40DD-AFC4-6F175D3DCCD1}">
+              <a14:hiddenFill xmlns:a14="http://schemas.microsoft.com/office/drawing/2010/main">
+                <a:solidFill>
+                  <a:srgbClr val="FFFFFF"/>
+                </a:solidFill>
+              </a14:hiddenFill>
+            </a:ext>
+          </a:extLst>
+        </p:spPr>
+      </p:pic>
+      <p:sp>
+        <p:nvSpPr>
+          <p:cNvPr id="14" name="TextBox 13"/>
+          <p:cNvSpPr txBox="1"/>
+          <p:nvPr/>
+        </p:nvSpPr>
+        <p:spPr>
+          <a:xfrm>
+            <a:off x="715951" y="5733913"/>
+            <a:ext cx="1337097" cy="646331"/>
+          </a:xfrm>
+          <a:prstGeom prst="rect">
+            <a:avLst/>
+          </a:prstGeom>
+          <a:noFill/>
+        </p:spPr>
+        <p:txBody>
+          <a:bodyPr wrap="none" rtlCol="0">
+            <a:spAutoFit/>
+          </a:bodyPr>
+          <a:lstStyle/>
+          <a:p>
+            <a:pPr algn="ctr"/>
+            <a:r>
+              <a:rPr lang="en-GB" dirty="0" smtClean="0"/>
+              <a:t>(Tax receipt)</a:t>
+            </a:r>
+          </a:p>
+          <a:p>
+            <a:pPr algn="ctr"/>
+            <a:r>
+              <a:rPr lang="en-GB" dirty="0" smtClean="0"/>
+              <a:t>Document</a:t>
+            </a:r>
+            <a:endParaRPr lang="en-GB" dirty="0"/>
+          </a:p>
+        </p:txBody>
+      </p:sp>
+      <p:pic>
+        <p:nvPicPr>
+          <p:cNvPr id="1028" name="Picture 4" descr="C:\GITHUB\incodehq\incode-module-document\dom\src\main\java\org\incode\module\document\dom\impl\paperclips\Paperclip.png"/>
+          <p:cNvPicPr>
+            <a:picLocks noChangeAspect="1" noChangeArrowheads="1"/>
+          </p:cNvPicPr>
+          <p:nvPr/>
+        </p:nvPicPr>
+        <p:blipFill>
+          <a:blip r:embed="rId4">
+            <a:extLst>
+              <a:ext uri="{28A0092B-C50C-407E-A947-70E740481C1C}">
+                <a14:useLocalDpi xmlns:a14="http://schemas.microsoft.com/office/drawing/2010/main" val="0"/>
+              </a:ext>
+            </a:extLst>
+          </a:blip>
+          <a:srcRect/>
+          <a:stretch>
+            <a:fillRect/>
+          </a:stretch>
+        </p:blipFill>
+        <p:spPr bwMode="auto">
+          <a:xfrm>
+            <a:off x="1331640" y="1667682"/>
+            <a:ext cx="518865" cy="518865"/>
+          </a:xfrm>
+          <a:prstGeom prst="rect">
+            <a:avLst/>
+          </a:prstGeom>
+          <a:noFill/>
+          <a:extLst>
+            <a:ext uri="{909E8E84-426E-40DD-AFC4-6F175D3DCCD1}">
+              <a14:hiddenFill xmlns:a14="http://schemas.microsoft.com/office/drawing/2010/main">
+                <a:solidFill>
+                  <a:srgbClr val="FFFFFF"/>
+                </a:solidFill>
+              </a14:hiddenFill>
+            </a:ext>
+          </a:extLst>
+        </p:spPr>
+      </p:pic>
+      <p:cxnSp>
+        <p:nvCxnSpPr>
+          <p:cNvPr id="11" name="Straight Connector 10"/>
+          <p:cNvCxnSpPr/>
+          <p:nvPr/>
+        </p:nvCxnSpPr>
+        <p:spPr>
+          <a:xfrm>
+            <a:off x="1074830" y="1387561"/>
+            <a:ext cx="1048898" cy="1015011"/>
+          </a:xfrm>
+          <a:prstGeom prst="line">
+            <a:avLst/>
+          </a:prstGeom>
+        </p:spPr>
+        <p:style>
+          <a:lnRef idx="1">
+            <a:schemeClr val="accent1"/>
+          </a:lnRef>
+          <a:fillRef idx="0">
+            <a:schemeClr val="accent1"/>
+          </a:fillRef>
+          <a:effectRef idx="0">
+            <a:schemeClr val="accent1"/>
+          </a:effectRef>
+          <a:fontRef idx="minor">
+            <a:schemeClr val="tx1"/>
+          </a:fontRef>
+        </p:style>
+      </p:cxnSp>
+      <p:pic>
+        <p:nvPicPr>
+          <p:cNvPr id="20" name="Picture 4" descr="C:\GITHUB\incodehq\incode-module-document\dom\src\main\java\org\incode\module\document\dom\impl\paperclips\Paperclip.png"/>
+          <p:cNvPicPr>
+            <a:picLocks noChangeAspect="1" noChangeArrowheads="1"/>
+          </p:cNvPicPr>
+          <p:nvPr/>
+        </p:nvPicPr>
+        <p:blipFill>
+          <a:blip r:embed="rId4">
+            <a:extLst>
+              <a:ext uri="{28A0092B-C50C-407E-A947-70E740481C1C}">
+                <a14:useLocalDpi xmlns:a14="http://schemas.microsoft.com/office/drawing/2010/main" val="0"/>
+              </a:ext>
+            </a:extLst>
+          </a:blip>
+          <a:srcRect/>
+          <a:stretch>
+            <a:fillRect/>
+          </a:stretch>
+        </p:blipFill>
+        <p:spPr bwMode="auto">
+          <a:xfrm>
+            <a:off x="1619505" y="3906829"/>
+            <a:ext cx="518865" cy="518865"/>
+          </a:xfrm>
+          <a:prstGeom prst="rect">
+            <a:avLst/>
+          </a:prstGeom>
+          <a:noFill/>
+          <a:extLst>
+            <a:ext uri="{909E8E84-426E-40DD-AFC4-6F175D3DCCD1}">
+              <a14:hiddenFill xmlns:a14="http://schemas.microsoft.com/office/drawing/2010/main">
+                <a:solidFill>
+                  <a:srgbClr val="FFFFFF"/>
+                </a:solidFill>
+              </a14:hiddenFill>
+            </a:ext>
+          </a:extLst>
+        </p:spPr>
+      </p:pic>
+      <p:cxnSp>
+        <p:nvCxnSpPr>
+          <p:cNvPr id="21" name="Straight Connector 20"/>
+          <p:cNvCxnSpPr/>
+          <p:nvPr/>
+        </p:nvCxnSpPr>
+        <p:spPr>
+          <a:xfrm flipH="1">
+            <a:off x="1362695" y="3626708"/>
+            <a:ext cx="1048898" cy="1015011"/>
+          </a:xfrm>
+          <a:prstGeom prst="line">
+            <a:avLst/>
+          </a:prstGeom>
+        </p:spPr>
+        <p:style>
+          <a:lnRef idx="1">
+            <a:schemeClr val="accent1"/>
+          </a:lnRef>
+          <a:fillRef idx="0">
+            <a:schemeClr val="accent1"/>
+          </a:fillRef>
+          <a:effectRef idx="0">
+            <a:schemeClr val="accent1"/>
+          </a:effectRef>
+          <a:fontRef idx="minor">
+            <a:schemeClr val="tx1"/>
+          </a:fontRef>
+        </p:style>
+      </p:cxnSp>
+      <p:pic>
+        <p:nvPicPr>
+          <p:cNvPr id="1029" name="Picture 5" descr="C:\GITHUB\incodehq\incode-module-communications\module\src\main\java\org\incode\module\communications\dom\impl\comms\Communication-email.png"/>
+          <p:cNvPicPr>
+            <a:picLocks noChangeAspect="1" noChangeArrowheads="1"/>
+          </p:cNvPicPr>
+          <p:nvPr/>
+        </p:nvPicPr>
+        <p:blipFill>
+          <a:blip r:embed="rId5">
+            <a:extLst>
+              <a:ext uri="{28A0092B-C50C-407E-A947-70E740481C1C}">
+                <a14:useLocalDpi xmlns:a14="http://schemas.microsoft.com/office/drawing/2010/main" val="0"/>
+              </a:ext>
+            </a:extLst>
+          </a:blip>
+          <a:srcRect/>
+          <a:stretch>
+            <a:fillRect/>
+          </a:stretch>
+        </p:blipFill>
+        <p:spPr bwMode="auto">
+          <a:xfrm>
+            <a:off x="6732240" y="2449322"/>
+            <a:ext cx="1163127" cy="1163127"/>
+          </a:xfrm>
+          <a:prstGeom prst="rect">
+            <a:avLst/>
+          </a:prstGeom>
+          <a:noFill/>
+          <a:extLst>
+            <a:ext uri="{909E8E84-426E-40DD-AFC4-6F175D3DCCD1}">
+              <a14:hiddenFill xmlns:a14="http://schemas.microsoft.com/office/drawing/2010/main">
+                <a:solidFill>
+                  <a:srgbClr val="FFFFFF"/>
+                </a:solidFill>
+              </a14:hiddenFill>
+            </a:ext>
+          </a:extLst>
+        </p:spPr>
+      </p:pic>
+      <p:sp>
+        <p:nvSpPr>
+          <p:cNvPr id="24" name="TextBox 23"/>
+          <p:cNvSpPr txBox="1"/>
+          <p:nvPr/>
+        </p:nvSpPr>
+        <p:spPr>
+          <a:xfrm>
+            <a:off x="6643394" y="3410684"/>
+            <a:ext cx="1673022" cy="646331"/>
+          </a:xfrm>
+          <a:prstGeom prst="rect">
+            <a:avLst/>
+          </a:prstGeom>
+          <a:noFill/>
+        </p:spPr>
+        <p:txBody>
+          <a:bodyPr wrap="none" rtlCol="0">
+            <a:spAutoFit/>
+          </a:bodyPr>
+          <a:lstStyle/>
+          <a:p>
+            <a:r>
+              <a:rPr lang="en-GB" dirty="0" smtClean="0"/>
               <a:t>(Email)</a:t>
             </a:r>
           </a:p>
@@ -4295,6 +5006,3122 @@
   <p:clrMapOvr>
     <a:masterClrMapping/>
   </p:clrMapOvr>
+  <p:timing>
+    <p:tnLst>
+      <p:par>
+        <p:cTn id="1" dur="indefinite" restart="never" nodeType="tmRoot"/>
+      </p:par>
+    </p:tnLst>
+  </p:timing>
+</p:sld>
+</file>
+
+<file path=ppt/slides/slide12.xml><?xml version="1.0" encoding="utf-8"?>
+<p:sld xmlns:a="http://schemas.openxmlformats.org/drawingml/2006/main" xmlns:r="http://schemas.openxmlformats.org/officeDocument/2006/relationships" xmlns:p="http://schemas.openxmlformats.org/presentationml/2006/main">
+  <p:cSld>
+    <p:spTree>
+      <p:nvGrpSpPr>
+        <p:cNvPr id="1" name=""/>
+        <p:cNvGrpSpPr/>
+        <p:nvPr/>
+      </p:nvGrpSpPr>
+      <p:grpSpPr>
+        <a:xfrm>
+          <a:off x="0" y="0"/>
+          <a:ext cx="0" cy="0"/>
+          <a:chOff x="0" y="0"/>
+          <a:chExt cx="0" cy="0"/>
+        </a:xfrm>
+      </p:grpSpPr>
+      <p:pic>
+        <p:nvPicPr>
+          <p:cNvPr id="1026" name="Picture 2" descr="C:\GITHUB\estatio\estatio\estatioapp\module\invoice\dom\src\main\java\org\estatio\dom\invoice\Invoice.png"/>
+          <p:cNvPicPr>
+            <a:picLocks noChangeAspect="1" noChangeArrowheads="1"/>
+          </p:cNvPicPr>
+          <p:nvPr/>
+        </p:nvPicPr>
+        <p:blipFill>
+          <a:blip r:embed="rId2">
+            <a:extLst>
+              <a:ext uri="{28A0092B-C50C-407E-A947-70E740481C1C}">
+                <a14:useLocalDpi xmlns:a14="http://schemas.microsoft.com/office/drawing/2010/main" val="0"/>
+              </a:ext>
+            </a:extLst>
+          </a:blip>
+          <a:srcRect/>
+          <a:stretch>
+            <a:fillRect/>
+          </a:stretch>
+        </p:blipFill>
+        <p:spPr bwMode="auto">
+          <a:xfrm>
+            <a:off x="211895" y="332656"/>
+            <a:ext cx="916260" cy="916260"/>
+          </a:xfrm>
+          <a:prstGeom prst="rect">
+            <a:avLst/>
+          </a:prstGeom>
+          <a:noFill/>
+          <a:extLst>
+            <a:ext uri="{909E8E84-426E-40DD-AFC4-6F175D3DCCD1}">
+              <a14:hiddenFill xmlns:a14="http://schemas.microsoft.com/office/drawing/2010/main">
+                <a:solidFill>
+                  <a:srgbClr val="FFFFFF"/>
+                </a:solidFill>
+              </a14:hiddenFill>
+            </a:ext>
+          </a:extLst>
+        </p:spPr>
+      </p:pic>
+      <p:sp>
+        <p:nvSpPr>
+          <p:cNvPr id="9" name="TextBox 8"/>
+          <p:cNvSpPr txBox="1"/>
+          <p:nvPr/>
+        </p:nvSpPr>
+        <p:spPr>
+          <a:xfrm>
+            <a:off x="1140729" y="332656"/>
+            <a:ext cx="850361" cy="369332"/>
+          </a:xfrm>
+          <a:prstGeom prst="rect">
+            <a:avLst/>
+          </a:prstGeom>
+          <a:noFill/>
+        </p:spPr>
+        <p:txBody>
+          <a:bodyPr wrap="none" rtlCol="0">
+            <a:spAutoFit/>
+          </a:bodyPr>
+          <a:lstStyle/>
+          <a:p>
+            <a:r>
+              <a:rPr lang="en-GB" dirty="0" smtClean="0"/>
+              <a:t>Invoice</a:t>
+            </a:r>
+            <a:endParaRPr lang="en-GB" dirty="0"/>
+          </a:p>
+        </p:txBody>
+      </p:sp>
+    </p:spTree>
+    <p:extLst>
+      <p:ext uri="{BB962C8B-B14F-4D97-AF65-F5344CB8AC3E}">
+        <p14:creationId xmlns:p14="http://schemas.microsoft.com/office/powerpoint/2010/main" val="335661757"/>
+      </p:ext>
+    </p:extLst>
+  </p:cSld>
+  <p:clrMapOvr>
+    <a:masterClrMapping/>
+  </p:clrMapOvr>
+  <p:timing>
+    <p:tnLst>
+      <p:par>
+        <p:cTn id="1" dur="indefinite" restart="never" nodeType="tmRoot"/>
+      </p:par>
+    </p:tnLst>
+  </p:timing>
+</p:sld>
+</file>
+
+<file path=ppt/slides/slide13.xml><?xml version="1.0" encoding="utf-8"?>
+<p:sld xmlns:a="http://schemas.openxmlformats.org/drawingml/2006/main" xmlns:r="http://schemas.openxmlformats.org/officeDocument/2006/relationships" xmlns:p="http://schemas.openxmlformats.org/presentationml/2006/main">
+  <p:cSld>
+    <p:spTree>
+      <p:nvGrpSpPr>
+        <p:cNvPr id="1" name=""/>
+        <p:cNvGrpSpPr/>
+        <p:nvPr/>
+      </p:nvGrpSpPr>
+      <p:grpSpPr>
+        <a:xfrm>
+          <a:off x="0" y="0"/>
+          <a:ext cx="0" cy="0"/>
+          <a:chOff x="0" y="0"/>
+          <a:chExt cx="0" cy="0"/>
+        </a:xfrm>
+      </p:grpSpPr>
+      <p:pic>
+        <p:nvPicPr>
+          <p:cNvPr id="1026" name="Picture 2" descr="C:\GITHUB\estatio\estatio\estatioapp\module\invoice\dom\src\main\java\org\estatio\dom\invoice\Invoice.png"/>
+          <p:cNvPicPr>
+            <a:picLocks noChangeAspect="1" noChangeArrowheads="1"/>
+          </p:cNvPicPr>
+          <p:nvPr/>
+        </p:nvPicPr>
+        <p:blipFill>
+          <a:blip r:embed="rId2">
+            <a:extLst>
+              <a:ext uri="{28A0092B-C50C-407E-A947-70E740481C1C}">
+                <a14:useLocalDpi xmlns:a14="http://schemas.microsoft.com/office/drawing/2010/main" val="0"/>
+              </a:ext>
+            </a:extLst>
+          </a:blip>
+          <a:srcRect/>
+          <a:stretch>
+            <a:fillRect/>
+          </a:stretch>
+        </p:blipFill>
+        <p:spPr bwMode="auto">
+          <a:xfrm>
+            <a:off x="211895" y="332656"/>
+            <a:ext cx="916260" cy="916260"/>
+          </a:xfrm>
+          <a:prstGeom prst="rect">
+            <a:avLst/>
+          </a:prstGeom>
+          <a:noFill/>
+          <a:extLst>
+            <a:ext uri="{909E8E84-426E-40DD-AFC4-6F175D3DCCD1}">
+              <a14:hiddenFill xmlns:a14="http://schemas.microsoft.com/office/drawing/2010/main">
+                <a:solidFill>
+                  <a:srgbClr val="FFFFFF"/>
+                </a:solidFill>
+              </a14:hiddenFill>
+            </a:ext>
+          </a:extLst>
+        </p:spPr>
+      </p:pic>
+      <p:sp>
+        <p:nvSpPr>
+          <p:cNvPr id="9" name="TextBox 8"/>
+          <p:cNvSpPr txBox="1"/>
+          <p:nvPr/>
+        </p:nvSpPr>
+        <p:spPr>
+          <a:xfrm>
+            <a:off x="1140729" y="332656"/>
+            <a:ext cx="850361" cy="369332"/>
+          </a:xfrm>
+          <a:prstGeom prst="rect">
+            <a:avLst/>
+          </a:prstGeom>
+          <a:noFill/>
+        </p:spPr>
+        <p:txBody>
+          <a:bodyPr wrap="none" rtlCol="0">
+            <a:spAutoFit/>
+          </a:bodyPr>
+          <a:lstStyle/>
+          <a:p>
+            <a:r>
+              <a:rPr lang="en-GB" dirty="0" smtClean="0"/>
+              <a:t>Invoice</a:t>
+            </a:r>
+            <a:endParaRPr lang="en-GB" dirty="0"/>
+          </a:p>
+        </p:txBody>
+      </p:sp>
+      <p:pic>
+        <p:nvPicPr>
+          <p:cNvPr id="13" name="Picture 3" descr="C:\GITHUB\incodehq\incode-module-document\dom\src\main\java\org\incode\module\document\dom\impl\docs\Document-pdf.png"/>
+          <p:cNvPicPr>
+            <a:picLocks noChangeAspect="1" noChangeArrowheads="1"/>
+          </p:cNvPicPr>
+          <p:nvPr/>
+        </p:nvPicPr>
+        <p:blipFill>
+          <a:blip r:embed="rId3">
+            <a:extLst>
+              <a:ext uri="{28A0092B-C50C-407E-A947-70E740481C1C}">
+                <a14:useLocalDpi xmlns:a14="http://schemas.microsoft.com/office/drawing/2010/main" val="0"/>
+              </a:ext>
+            </a:extLst>
+          </a:blip>
+          <a:srcRect/>
+          <a:stretch>
+            <a:fillRect/>
+          </a:stretch>
+        </p:blipFill>
+        <p:spPr bwMode="auto">
+          <a:xfrm>
+            <a:off x="827584" y="4785735"/>
+            <a:ext cx="916260" cy="916260"/>
+          </a:xfrm>
+          <a:prstGeom prst="rect">
+            <a:avLst/>
+          </a:prstGeom>
+          <a:noFill/>
+          <a:extLst>
+            <a:ext uri="{909E8E84-426E-40DD-AFC4-6F175D3DCCD1}">
+              <a14:hiddenFill xmlns:a14="http://schemas.microsoft.com/office/drawing/2010/main">
+                <a:solidFill>
+                  <a:srgbClr val="FFFFFF"/>
+                </a:solidFill>
+              </a14:hiddenFill>
+            </a:ext>
+          </a:extLst>
+        </p:spPr>
+      </p:pic>
+      <p:sp>
+        <p:nvSpPr>
+          <p:cNvPr id="14" name="TextBox 13"/>
+          <p:cNvSpPr txBox="1"/>
+          <p:nvPr/>
+        </p:nvSpPr>
+        <p:spPr>
+          <a:xfrm>
+            <a:off x="715951" y="5733913"/>
+            <a:ext cx="1337097" cy="646331"/>
+          </a:xfrm>
+          <a:prstGeom prst="rect">
+            <a:avLst/>
+          </a:prstGeom>
+          <a:noFill/>
+        </p:spPr>
+        <p:txBody>
+          <a:bodyPr wrap="none" rtlCol="0">
+            <a:spAutoFit/>
+          </a:bodyPr>
+          <a:lstStyle/>
+          <a:p>
+            <a:pPr algn="ctr"/>
+            <a:r>
+              <a:rPr lang="en-GB" dirty="0" smtClean="0"/>
+              <a:t>(Tax receipt)</a:t>
+            </a:r>
+          </a:p>
+          <a:p>
+            <a:pPr algn="ctr"/>
+            <a:r>
+              <a:rPr lang="en-GB" dirty="0" smtClean="0"/>
+              <a:t>Document</a:t>
+            </a:r>
+            <a:endParaRPr lang="en-GB" dirty="0"/>
+          </a:p>
+        </p:txBody>
+      </p:sp>
+      <p:pic>
+        <p:nvPicPr>
+          <p:cNvPr id="20" name="Picture 4" descr="C:\GITHUB\incodehq\incode-module-document\dom\src\main\java\org\incode\module\document\dom\impl\paperclips\Paperclip.png"/>
+          <p:cNvPicPr>
+            <a:picLocks noChangeAspect="1" noChangeArrowheads="1"/>
+          </p:cNvPicPr>
+          <p:nvPr/>
+        </p:nvPicPr>
+        <p:blipFill>
+          <a:blip r:embed="rId4">
+            <a:extLst>
+              <a:ext uri="{28A0092B-C50C-407E-A947-70E740481C1C}">
+                <a14:useLocalDpi xmlns:a14="http://schemas.microsoft.com/office/drawing/2010/main" val="0"/>
+              </a:ext>
+            </a:extLst>
+          </a:blip>
+          <a:srcRect/>
+          <a:stretch>
+            <a:fillRect/>
+          </a:stretch>
+        </p:blipFill>
+        <p:spPr bwMode="auto">
+          <a:xfrm>
+            <a:off x="780858" y="2767814"/>
+            <a:ext cx="518865" cy="518865"/>
+          </a:xfrm>
+          <a:prstGeom prst="rect">
+            <a:avLst/>
+          </a:prstGeom>
+          <a:noFill/>
+          <a:extLst>
+            <a:ext uri="{909E8E84-426E-40DD-AFC4-6F175D3DCCD1}">
+              <a14:hiddenFill xmlns:a14="http://schemas.microsoft.com/office/drawing/2010/main">
+                <a:solidFill>
+                  <a:srgbClr val="FFFFFF"/>
+                </a:solidFill>
+              </a14:hiddenFill>
+            </a:ext>
+          </a:extLst>
+        </p:spPr>
+      </p:pic>
+      <p:cxnSp>
+        <p:nvCxnSpPr>
+          <p:cNvPr id="21" name="Straight Connector 20"/>
+          <p:cNvCxnSpPr/>
+          <p:nvPr/>
+        </p:nvCxnSpPr>
+        <p:spPr>
+          <a:xfrm>
+            <a:off x="827584" y="1412776"/>
+            <a:ext cx="535111" cy="3228943"/>
+          </a:xfrm>
+          <a:prstGeom prst="line">
+            <a:avLst/>
+          </a:prstGeom>
+        </p:spPr>
+        <p:style>
+          <a:lnRef idx="1">
+            <a:schemeClr val="accent1"/>
+          </a:lnRef>
+          <a:fillRef idx="0">
+            <a:schemeClr val="accent1"/>
+          </a:fillRef>
+          <a:effectRef idx="0">
+            <a:schemeClr val="accent1"/>
+          </a:effectRef>
+          <a:fontRef idx="minor">
+            <a:schemeClr val="tx1"/>
+          </a:fontRef>
+        </p:style>
+      </p:cxnSp>
+      <p:sp>
+        <p:nvSpPr>
+          <p:cNvPr id="25" name="TextBox 24"/>
+          <p:cNvSpPr txBox="1"/>
+          <p:nvPr/>
+        </p:nvSpPr>
+        <p:spPr>
+          <a:xfrm>
+            <a:off x="3203848" y="188640"/>
+            <a:ext cx="2583271" cy="646331"/>
+          </a:xfrm>
+          <a:prstGeom prst="rect">
+            <a:avLst/>
+          </a:prstGeom>
+          <a:noFill/>
+        </p:spPr>
+        <p:txBody>
+          <a:bodyPr wrap="none" rtlCol="0">
+            <a:spAutoFit/>
+          </a:bodyPr>
+          <a:lstStyle/>
+          <a:p>
+            <a:r>
+              <a:rPr lang="en-GB" sz="3600" dirty="0" smtClean="0">
+                <a:solidFill>
+                  <a:srgbClr val="00B050"/>
+                </a:solidFill>
+              </a:rPr>
+              <a:t>“Attach PDF”</a:t>
+            </a:r>
+            <a:endParaRPr lang="en-GB" sz="3600" dirty="0">
+              <a:solidFill>
+                <a:srgbClr val="00B050"/>
+              </a:solidFill>
+            </a:endParaRPr>
+          </a:p>
+        </p:txBody>
+      </p:sp>
+    </p:spTree>
+    <p:extLst>
+      <p:ext uri="{BB962C8B-B14F-4D97-AF65-F5344CB8AC3E}">
+        <p14:creationId xmlns:p14="http://schemas.microsoft.com/office/powerpoint/2010/main" val="3803749848"/>
+      </p:ext>
+    </p:extLst>
+  </p:cSld>
+  <p:clrMapOvr>
+    <a:masterClrMapping/>
+  </p:clrMapOvr>
+  <p:timing>
+    <p:tnLst>
+      <p:par>
+        <p:cTn id="1" dur="indefinite" restart="never" nodeType="tmRoot"/>
+      </p:par>
+    </p:tnLst>
+  </p:timing>
+</p:sld>
+</file>
+
+<file path=ppt/slides/slide14.xml><?xml version="1.0" encoding="utf-8"?>
+<p:sld xmlns:a="http://schemas.openxmlformats.org/drawingml/2006/main" xmlns:r="http://schemas.openxmlformats.org/officeDocument/2006/relationships" xmlns:p="http://schemas.openxmlformats.org/presentationml/2006/main">
+  <p:cSld>
+    <p:spTree>
+      <p:nvGrpSpPr>
+        <p:cNvPr id="1" name=""/>
+        <p:cNvGrpSpPr/>
+        <p:nvPr/>
+      </p:nvGrpSpPr>
+      <p:grpSpPr>
+        <a:xfrm>
+          <a:off x="0" y="0"/>
+          <a:ext cx="0" cy="0"/>
+          <a:chOff x="0" y="0"/>
+          <a:chExt cx="0" cy="0"/>
+        </a:xfrm>
+      </p:grpSpPr>
+      <p:pic>
+        <p:nvPicPr>
+          <p:cNvPr id="1026" name="Picture 2" descr="C:\GITHUB\estatio\estatio\estatioapp\module\invoice\dom\src\main\java\org\estatio\dom\invoice\Invoice.png"/>
+          <p:cNvPicPr>
+            <a:picLocks noChangeAspect="1" noChangeArrowheads="1"/>
+          </p:cNvPicPr>
+          <p:nvPr/>
+        </p:nvPicPr>
+        <p:blipFill>
+          <a:blip r:embed="rId2">
+            <a:extLst>
+              <a:ext uri="{28A0092B-C50C-407E-A947-70E740481C1C}">
+                <a14:useLocalDpi xmlns:a14="http://schemas.microsoft.com/office/drawing/2010/main" val="0"/>
+              </a:ext>
+            </a:extLst>
+          </a:blip>
+          <a:srcRect/>
+          <a:stretch>
+            <a:fillRect/>
+          </a:stretch>
+        </p:blipFill>
+        <p:spPr bwMode="auto">
+          <a:xfrm>
+            <a:off x="211895" y="332656"/>
+            <a:ext cx="916260" cy="916260"/>
+          </a:xfrm>
+          <a:prstGeom prst="rect">
+            <a:avLst/>
+          </a:prstGeom>
+          <a:noFill/>
+          <a:extLst>
+            <a:ext uri="{909E8E84-426E-40DD-AFC4-6F175D3DCCD1}">
+              <a14:hiddenFill xmlns:a14="http://schemas.microsoft.com/office/drawing/2010/main">
+                <a:solidFill>
+                  <a:srgbClr val="FFFFFF"/>
+                </a:solidFill>
+              </a14:hiddenFill>
+            </a:ext>
+          </a:extLst>
+        </p:spPr>
+      </p:pic>
+      <p:sp>
+        <p:nvSpPr>
+          <p:cNvPr id="9" name="TextBox 8"/>
+          <p:cNvSpPr txBox="1"/>
+          <p:nvPr/>
+        </p:nvSpPr>
+        <p:spPr>
+          <a:xfrm>
+            <a:off x="1140729" y="332656"/>
+            <a:ext cx="850361" cy="369332"/>
+          </a:xfrm>
+          <a:prstGeom prst="rect">
+            <a:avLst/>
+          </a:prstGeom>
+          <a:noFill/>
+        </p:spPr>
+        <p:txBody>
+          <a:bodyPr wrap="none" rtlCol="0">
+            <a:spAutoFit/>
+          </a:bodyPr>
+          <a:lstStyle/>
+          <a:p>
+            <a:r>
+              <a:rPr lang="en-GB" dirty="0" smtClean="0"/>
+              <a:t>Invoice</a:t>
+            </a:r>
+            <a:endParaRPr lang="en-GB" dirty="0"/>
+          </a:p>
+        </p:txBody>
+      </p:sp>
+      <p:pic>
+        <p:nvPicPr>
+          <p:cNvPr id="13" name="Picture 3" descr="C:\GITHUB\incodehq\incode-module-document\dom\src\main\java\org\incode\module\document\dom\impl\docs\Document-pdf.png"/>
+          <p:cNvPicPr>
+            <a:picLocks noChangeAspect="1" noChangeArrowheads="1"/>
+          </p:cNvPicPr>
+          <p:nvPr/>
+        </p:nvPicPr>
+        <p:blipFill>
+          <a:blip r:embed="rId3">
+            <a:extLst>
+              <a:ext uri="{28A0092B-C50C-407E-A947-70E740481C1C}">
+                <a14:useLocalDpi xmlns:a14="http://schemas.microsoft.com/office/drawing/2010/main" val="0"/>
+              </a:ext>
+            </a:extLst>
+          </a:blip>
+          <a:srcRect/>
+          <a:stretch>
+            <a:fillRect/>
+          </a:stretch>
+        </p:blipFill>
+        <p:spPr bwMode="auto">
+          <a:xfrm>
+            <a:off x="827584" y="4785735"/>
+            <a:ext cx="916260" cy="916260"/>
+          </a:xfrm>
+          <a:prstGeom prst="rect">
+            <a:avLst/>
+          </a:prstGeom>
+          <a:noFill/>
+          <a:extLst>
+            <a:ext uri="{909E8E84-426E-40DD-AFC4-6F175D3DCCD1}">
+              <a14:hiddenFill xmlns:a14="http://schemas.microsoft.com/office/drawing/2010/main">
+                <a:solidFill>
+                  <a:srgbClr val="FFFFFF"/>
+                </a:solidFill>
+              </a14:hiddenFill>
+            </a:ext>
+          </a:extLst>
+        </p:spPr>
+      </p:pic>
+      <p:sp>
+        <p:nvSpPr>
+          <p:cNvPr id="14" name="TextBox 13"/>
+          <p:cNvSpPr txBox="1"/>
+          <p:nvPr/>
+        </p:nvSpPr>
+        <p:spPr>
+          <a:xfrm>
+            <a:off x="715951" y="5733913"/>
+            <a:ext cx="1337097" cy="646331"/>
+          </a:xfrm>
+          <a:prstGeom prst="rect">
+            <a:avLst/>
+          </a:prstGeom>
+          <a:noFill/>
+        </p:spPr>
+        <p:txBody>
+          <a:bodyPr wrap="none" rtlCol="0">
+            <a:spAutoFit/>
+          </a:bodyPr>
+          <a:lstStyle/>
+          <a:p>
+            <a:pPr algn="ctr"/>
+            <a:r>
+              <a:rPr lang="en-GB" dirty="0" smtClean="0"/>
+              <a:t>(Tax receipt)</a:t>
+            </a:r>
+          </a:p>
+          <a:p>
+            <a:pPr algn="ctr"/>
+            <a:r>
+              <a:rPr lang="en-GB" dirty="0" smtClean="0"/>
+              <a:t>Document</a:t>
+            </a:r>
+            <a:endParaRPr lang="en-GB" dirty="0"/>
+          </a:p>
+        </p:txBody>
+      </p:sp>
+      <p:pic>
+        <p:nvPicPr>
+          <p:cNvPr id="20" name="Picture 4" descr="C:\GITHUB\incodehq\incode-module-document\dom\src\main\java\org\incode\module\document\dom\impl\paperclips\Paperclip.png"/>
+          <p:cNvPicPr>
+            <a:picLocks noChangeAspect="1" noChangeArrowheads="1"/>
+          </p:cNvPicPr>
+          <p:nvPr/>
+        </p:nvPicPr>
+        <p:blipFill>
+          <a:blip r:embed="rId4">
+            <a:extLst>
+              <a:ext uri="{28A0092B-C50C-407E-A947-70E740481C1C}">
+                <a14:useLocalDpi xmlns:a14="http://schemas.microsoft.com/office/drawing/2010/main" val="0"/>
+              </a:ext>
+            </a:extLst>
+          </a:blip>
+          <a:srcRect/>
+          <a:stretch>
+            <a:fillRect/>
+          </a:stretch>
+        </p:blipFill>
+        <p:spPr bwMode="auto">
+          <a:xfrm>
+            <a:off x="780858" y="2767814"/>
+            <a:ext cx="518865" cy="518865"/>
+          </a:xfrm>
+          <a:prstGeom prst="rect">
+            <a:avLst/>
+          </a:prstGeom>
+          <a:noFill/>
+          <a:extLst>
+            <a:ext uri="{909E8E84-426E-40DD-AFC4-6F175D3DCCD1}">
+              <a14:hiddenFill xmlns:a14="http://schemas.microsoft.com/office/drawing/2010/main">
+                <a:solidFill>
+                  <a:srgbClr val="FFFFFF"/>
+                </a:solidFill>
+              </a14:hiddenFill>
+            </a:ext>
+          </a:extLst>
+        </p:spPr>
+      </p:pic>
+      <p:cxnSp>
+        <p:nvCxnSpPr>
+          <p:cNvPr id="21" name="Straight Connector 20"/>
+          <p:cNvCxnSpPr/>
+          <p:nvPr/>
+        </p:nvCxnSpPr>
+        <p:spPr>
+          <a:xfrm>
+            <a:off x="827584" y="1412776"/>
+            <a:ext cx="535111" cy="3228943"/>
+          </a:xfrm>
+          <a:prstGeom prst="line">
+            <a:avLst/>
+          </a:prstGeom>
+        </p:spPr>
+        <p:style>
+          <a:lnRef idx="1">
+            <a:schemeClr val="accent1"/>
+          </a:lnRef>
+          <a:fillRef idx="0">
+            <a:schemeClr val="accent1"/>
+          </a:fillRef>
+          <a:effectRef idx="0">
+            <a:schemeClr val="accent1"/>
+          </a:effectRef>
+          <a:fontRef idx="minor">
+            <a:schemeClr val="tx1"/>
+          </a:fontRef>
+        </p:style>
+      </p:cxnSp>
+      <p:sp>
+        <p:nvSpPr>
+          <p:cNvPr id="25" name="TextBox 24"/>
+          <p:cNvSpPr txBox="1"/>
+          <p:nvPr/>
+        </p:nvSpPr>
+        <p:spPr>
+          <a:xfrm>
+            <a:off x="3203848" y="188640"/>
+            <a:ext cx="2041585" cy="646331"/>
+          </a:xfrm>
+          <a:prstGeom prst="rect">
+            <a:avLst/>
+          </a:prstGeom>
+          <a:noFill/>
+        </p:spPr>
+        <p:txBody>
+          <a:bodyPr wrap="none" rtlCol="0">
+            <a:spAutoFit/>
+          </a:bodyPr>
+          <a:lstStyle/>
+          <a:p>
+            <a:r>
+              <a:rPr lang="en-GB" sz="3600" dirty="0" smtClean="0">
+                <a:solidFill>
+                  <a:srgbClr val="00B050"/>
+                </a:solidFill>
+              </a:rPr>
+              <a:t>“Prepare”</a:t>
+            </a:r>
+            <a:endParaRPr lang="en-GB" sz="3600" dirty="0">
+              <a:solidFill>
+                <a:srgbClr val="00B050"/>
+              </a:solidFill>
+            </a:endParaRPr>
+          </a:p>
+        </p:txBody>
+      </p:sp>
+      <p:pic>
+        <p:nvPicPr>
+          <p:cNvPr id="10" name="Picture 3" descr="C:\GITHUB\incodehq\incode-module-document\dom\src\main\java\org\incode\module\document\dom\impl\docs\Document-pdf.png"/>
+          <p:cNvPicPr>
+            <a:picLocks noChangeAspect="1" noChangeArrowheads="1"/>
+          </p:cNvPicPr>
+          <p:nvPr/>
+        </p:nvPicPr>
+        <p:blipFill>
+          <a:blip r:embed="rId3">
+            <a:extLst>
+              <a:ext uri="{28A0092B-C50C-407E-A947-70E740481C1C}">
+                <a14:useLocalDpi xmlns:a14="http://schemas.microsoft.com/office/drawing/2010/main" val="0"/>
+              </a:ext>
+            </a:extLst>
+          </a:blip>
+          <a:srcRect/>
+          <a:stretch>
+            <a:fillRect/>
+          </a:stretch>
+        </p:blipFill>
+        <p:spPr bwMode="auto">
+          <a:xfrm>
+            <a:off x="2363960" y="2546588"/>
+            <a:ext cx="916260" cy="916260"/>
+          </a:xfrm>
+          <a:prstGeom prst="rect">
+            <a:avLst/>
+          </a:prstGeom>
+          <a:noFill/>
+          <a:extLst>
+            <a:ext uri="{909E8E84-426E-40DD-AFC4-6F175D3DCCD1}">
+              <a14:hiddenFill xmlns:a14="http://schemas.microsoft.com/office/drawing/2010/main">
+                <a:solidFill>
+                  <a:srgbClr val="FFFFFF"/>
+                </a:solidFill>
+              </a14:hiddenFill>
+            </a:ext>
+          </a:extLst>
+        </p:spPr>
+      </p:pic>
+      <p:sp>
+        <p:nvSpPr>
+          <p:cNvPr id="11" name="TextBox 10"/>
+          <p:cNvSpPr txBox="1"/>
+          <p:nvPr/>
+        </p:nvSpPr>
+        <p:spPr>
+          <a:xfrm>
+            <a:off x="2372135" y="3484433"/>
+            <a:ext cx="1165191" cy="646331"/>
+          </a:xfrm>
+          <a:prstGeom prst="rect">
+            <a:avLst/>
+          </a:prstGeom>
+          <a:noFill/>
+        </p:spPr>
+        <p:txBody>
+          <a:bodyPr wrap="none" rtlCol="0">
+            <a:spAutoFit/>
+          </a:bodyPr>
+          <a:lstStyle/>
+          <a:p>
+            <a:r>
+              <a:rPr lang="en-GB" dirty="0" smtClean="0"/>
+              <a:t>(Invoice)</a:t>
+            </a:r>
+          </a:p>
+          <a:p>
+            <a:r>
+              <a:rPr lang="en-GB" dirty="0" smtClean="0"/>
+              <a:t>Document</a:t>
+            </a:r>
+            <a:endParaRPr lang="en-GB" dirty="0"/>
+          </a:p>
+        </p:txBody>
+      </p:sp>
+      <p:pic>
+        <p:nvPicPr>
+          <p:cNvPr id="12" name="Picture 4" descr="C:\GITHUB\incodehq\incode-module-document\dom\src\main\java\org\incode\module\document\dom\impl\paperclips\Paperclip.png"/>
+          <p:cNvPicPr>
+            <a:picLocks noChangeAspect="1" noChangeArrowheads="1"/>
+          </p:cNvPicPr>
+          <p:nvPr/>
+        </p:nvPicPr>
+        <p:blipFill>
+          <a:blip r:embed="rId4">
+            <a:extLst>
+              <a:ext uri="{28A0092B-C50C-407E-A947-70E740481C1C}">
+                <a14:useLocalDpi xmlns:a14="http://schemas.microsoft.com/office/drawing/2010/main" val="0"/>
+              </a:ext>
+            </a:extLst>
+          </a:blip>
+          <a:srcRect/>
+          <a:stretch>
+            <a:fillRect/>
+          </a:stretch>
+        </p:blipFill>
+        <p:spPr bwMode="auto">
+          <a:xfrm>
+            <a:off x="1331640" y="1667682"/>
+            <a:ext cx="518865" cy="518865"/>
+          </a:xfrm>
+          <a:prstGeom prst="rect">
+            <a:avLst/>
+          </a:prstGeom>
+          <a:noFill/>
+          <a:extLst>
+            <a:ext uri="{909E8E84-426E-40DD-AFC4-6F175D3DCCD1}">
+              <a14:hiddenFill xmlns:a14="http://schemas.microsoft.com/office/drawing/2010/main">
+                <a:solidFill>
+                  <a:srgbClr val="FFFFFF"/>
+                </a:solidFill>
+              </a14:hiddenFill>
+            </a:ext>
+          </a:extLst>
+        </p:spPr>
+      </p:pic>
+      <p:cxnSp>
+        <p:nvCxnSpPr>
+          <p:cNvPr id="15" name="Straight Connector 14"/>
+          <p:cNvCxnSpPr/>
+          <p:nvPr/>
+        </p:nvCxnSpPr>
+        <p:spPr>
+          <a:xfrm>
+            <a:off x="1074830" y="1387561"/>
+            <a:ext cx="1048898" cy="1015011"/>
+          </a:xfrm>
+          <a:prstGeom prst="line">
+            <a:avLst/>
+          </a:prstGeom>
+        </p:spPr>
+        <p:style>
+          <a:lnRef idx="1">
+            <a:schemeClr val="accent1"/>
+          </a:lnRef>
+          <a:fillRef idx="0">
+            <a:schemeClr val="accent1"/>
+          </a:fillRef>
+          <a:effectRef idx="0">
+            <a:schemeClr val="accent1"/>
+          </a:effectRef>
+          <a:fontRef idx="minor">
+            <a:schemeClr val="tx1"/>
+          </a:fontRef>
+        </p:style>
+      </p:cxnSp>
+      <p:cxnSp>
+        <p:nvCxnSpPr>
+          <p:cNvPr id="16" name="Straight Connector 15"/>
+          <p:cNvCxnSpPr/>
+          <p:nvPr/>
+        </p:nvCxnSpPr>
+        <p:spPr>
+          <a:xfrm>
+            <a:off x="1227230" y="1539961"/>
+            <a:ext cx="1048898" cy="1015011"/>
+          </a:xfrm>
+          <a:prstGeom prst="line">
+            <a:avLst/>
+          </a:prstGeom>
+        </p:spPr>
+        <p:style>
+          <a:lnRef idx="1">
+            <a:schemeClr val="accent1"/>
+          </a:lnRef>
+          <a:fillRef idx="0">
+            <a:schemeClr val="accent1"/>
+          </a:fillRef>
+          <a:effectRef idx="0">
+            <a:schemeClr val="accent1"/>
+          </a:effectRef>
+          <a:fontRef idx="minor">
+            <a:schemeClr val="tx1"/>
+          </a:fontRef>
+        </p:style>
+      </p:cxnSp>
+    </p:spTree>
+    <p:extLst>
+      <p:ext uri="{BB962C8B-B14F-4D97-AF65-F5344CB8AC3E}">
+        <p14:creationId xmlns:p14="http://schemas.microsoft.com/office/powerpoint/2010/main" val="3569851147"/>
+      </p:ext>
+    </p:extLst>
+  </p:cSld>
+  <p:clrMapOvr>
+    <a:masterClrMapping/>
+  </p:clrMapOvr>
+  <p:timing>
+    <p:tnLst>
+      <p:par>
+        <p:cTn id="1" dur="indefinite" restart="never" nodeType="tmRoot"/>
+      </p:par>
+    </p:tnLst>
+  </p:timing>
+</p:sld>
+</file>
+
+<file path=ppt/slides/slide15.xml><?xml version="1.0" encoding="utf-8"?>
+<p:sld xmlns:a="http://schemas.openxmlformats.org/drawingml/2006/main" xmlns:r="http://schemas.openxmlformats.org/officeDocument/2006/relationships" xmlns:p="http://schemas.openxmlformats.org/presentationml/2006/main">
+  <p:cSld>
+    <p:spTree>
+      <p:nvGrpSpPr>
+        <p:cNvPr id="1" name=""/>
+        <p:cNvGrpSpPr/>
+        <p:nvPr/>
+      </p:nvGrpSpPr>
+      <p:grpSpPr>
+        <a:xfrm>
+          <a:off x="0" y="0"/>
+          <a:ext cx="0" cy="0"/>
+          <a:chOff x="0" y="0"/>
+          <a:chExt cx="0" cy="0"/>
+        </a:xfrm>
+      </p:grpSpPr>
+      <p:pic>
+        <p:nvPicPr>
+          <p:cNvPr id="1026" name="Picture 2" descr="C:\GITHUB\estatio\estatio\estatioapp\module\invoice\dom\src\main\java\org\estatio\dom\invoice\Invoice.png"/>
+          <p:cNvPicPr>
+            <a:picLocks noChangeAspect="1" noChangeArrowheads="1"/>
+          </p:cNvPicPr>
+          <p:nvPr/>
+        </p:nvPicPr>
+        <p:blipFill>
+          <a:blip r:embed="rId2">
+            <a:extLst>
+              <a:ext uri="{28A0092B-C50C-407E-A947-70E740481C1C}">
+                <a14:useLocalDpi xmlns:a14="http://schemas.microsoft.com/office/drawing/2010/main" val="0"/>
+              </a:ext>
+            </a:extLst>
+          </a:blip>
+          <a:srcRect/>
+          <a:stretch>
+            <a:fillRect/>
+          </a:stretch>
+        </p:blipFill>
+        <p:spPr bwMode="auto">
+          <a:xfrm>
+            <a:off x="211895" y="332656"/>
+            <a:ext cx="916260" cy="916260"/>
+          </a:xfrm>
+          <a:prstGeom prst="rect">
+            <a:avLst/>
+          </a:prstGeom>
+          <a:noFill/>
+          <a:extLst>
+            <a:ext uri="{909E8E84-426E-40DD-AFC4-6F175D3DCCD1}">
+              <a14:hiddenFill xmlns:a14="http://schemas.microsoft.com/office/drawing/2010/main">
+                <a:solidFill>
+                  <a:srgbClr val="FFFFFF"/>
+                </a:solidFill>
+              </a14:hiddenFill>
+            </a:ext>
+          </a:extLst>
+        </p:spPr>
+      </p:pic>
+      <p:sp>
+        <p:nvSpPr>
+          <p:cNvPr id="9" name="TextBox 8"/>
+          <p:cNvSpPr txBox="1"/>
+          <p:nvPr/>
+        </p:nvSpPr>
+        <p:spPr>
+          <a:xfrm>
+            <a:off x="1140729" y="332656"/>
+            <a:ext cx="850361" cy="369332"/>
+          </a:xfrm>
+          <a:prstGeom prst="rect">
+            <a:avLst/>
+          </a:prstGeom>
+          <a:noFill/>
+        </p:spPr>
+        <p:txBody>
+          <a:bodyPr wrap="none" rtlCol="0">
+            <a:spAutoFit/>
+          </a:bodyPr>
+          <a:lstStyle/>
+          <a:p>
+            <a:r>
+              <a:rPr lang="en-GB" dirty="0" smtClean="0"/>
+              <a:t>Invoice</a:t>
+            </a:r>
+            <a:endParaRPr lang="en-GB" dirty="0"/>
+          </a:p>
+        </p:txBody>
+      </p:sp>
+      <p:pic>
+        <p:nvPicPr>
+          <p:cNvPr id="13" name="Picture 3" descr="C:\GITHUB\incodehq\incode-module-document\dom\src\main\java\org\incode\module\document\dom\impl\docs\Document-pdf.png"/>
+          <p:cNvPicPr>
+            <a:picLocks noChangeAspect="1" noChangeArrowheads="1"/>
+          </p:cNvPicPr>
+          <p:nvPr/>
+        </p:nvPicPr>
+        <p:blipFill>
+          <a:blip r:embed="rId3">
+            <a:extLst>
+              <a:ext uri="{28A0092B-C50C-407E-A947-70E740481C1C}">
+                <a14:useLocalDpi xmlns:a14="http://schemas.microsoft.com/office/drawing/2010/main" val="0"/>
+              </a:ext>
+            </a:extLst>
+          </a:blip>
+          <a:srcRect/>
+          <a:stretch>
+            <a:fillRect/>
+          </a:stretch>
+        </p:blipFill>
+        <p:spPr bwMode="auto">
+          <a:xfrm>
+            <a:off x="827584" y="4785735"/>
+            <a:ext cx="916260" cy="916260"/>
+          </a:xfrm>
+          <a:prstGeom prst="rect">
+            <a:avLst/>
+          </a:prstGeom>
+          <a:noFill/>
+          <a:extLst>
+            <a:ext uri="{909E8E84-426E-40DD-AFC4-6F175D3DCCD1}">
+              <a14:hiddenFill xmlns:a14="http://schemas.microsoft.com/office/drawing/2010/main">
+                <a:solidFill>
+                  <a:srgbClr val="FFFFFF"/>
+                </a:solidFill>
+              </a14:hiddenFill>
+            </a:ext>
+          </a:extLst>
+        </p:spPr>
+      </p:pic>
+      <p:sp>
+        <p:nvSpPr>
+          <p:cNvPr id="14" name="TextBox 13"/>
+          <p:cNvSpPr txBox="1"/>
+          <p:nvPr/>
+        </p:nvSpPr>
+        <p:spPr>
+          <a:xfrm>
+            <a:off x="715951" y="5733913"/>
+            <a:ext cx="1337097" cy="646331"/>
+          </a:xfrm>
+          <a:prstGeom prst="rect">
+            <a:avLst/>
+          </a:prstGeom>
+          <a:noFill/>
+        </p:spPr>
+        <p:txBody>
+          <a:bodyPr wrap="none" rtlCol="0">
+            <a:spAutoFit/>
+          </a:bodyPr>
+          <a:lstStyle/>
+          <a:p>
+            <a:pPr algn="ctr"/>
+            <a:r>
+              <a:rPr lang="en-GB" dirty="0" smtClean="0"/>
+              <a:t>(Tax receipt)</a:t>
+            </a:r>
+          </a:p>
+          <a:p>
+            <a:pPr algn="ctr"/>
+            <a:r>
+              <a:rPr lang="en-GB" dirty="0" smtClean="0"/>
+              <a:t>Document</a:t>
+            </a:r>
+            <a:endParaRPr lang="en-GB" dirty="0"/>
+          </a:p>
+        </p:txBody>
+      </p:sp>
+      <p:pic>
+        <p:nvPicPr>
+          <p:cNvPr id="20" name="Picture 4" descr="C:\GITHUB\incodehq\incode-module-document\dom\src\main\java\org\incode\module\document\dom\impl\paperclips\Paperclip.png"/>
+          <p:cNvPicPr>
+            <a:picLocks noChangeAspect="1" noChangeArrowheads="1"/>
+          </p:cNvPicPr>
+          <p:nvPr/>
+        </p:nvPicPr>
+        <p:blipFill>
+          <a:blip r:embed="rId4">
+            <a:extLst>
+              <a:ext uri="{28A0092B-C50C-407E-A947-70E740481C1C}">
+                <a14:useLocalDpi xmlns:a14="http://schemas.microsoft.com/office/drawing/2010/main" val="0"/>
+              </a:ext>
+            </a:extLst>
+          </a:blip>
+          <a:srcRect/>
+          <a:stretch>
+            <a:fillRect/>
+          </a:stretch>
+        </p:blipFill>
+        <p:spPr bwMode="auto">
+          <a:xfrm>
+            <a:off x="780858" y="2767814"/>
+            <a:ext cx="518865" cy="518865"/>
+          </a:xfrm>
+          <a:prstGeom prst="rect">
+            <a:avLst/>
+          </a:prstGeom>
+          <a:noFill/>
+          <a:extLst>
+            <a:ext uri="{909E8E84-426E-40DD-AFC4-6F175D3DCCD1}">
+              <a14:hiddenFill xmlns:a14="http://schemas.microsoft.com/office/drawing/2010/main">
+                <a:solidFill>
+                  <a:srgbClr val="FFFFFF"/>
+                </a:solidFill>
+              </a14:hiddenFill>
+            </a:ext>
+          </a:extLst>
+        </p:spPr>
+      </p:pic>
+      <p:cxnSp>
+        <p:nvCxnSpPr>
+          <p:cNvPr id="21" name="Straight Connector 20"/>
+          <p:cNvCxnSpPr/>
+          <p:nvPr/>
+        </p:nvCxnSpPr>
+        <p:spPr>
+          <a:xfrm>
+            <a:off x="827584" y="1412776"/>
+            <a:ext cx="535111" cy="3228943"/>
+          </a:xfrm>
+          <a:prstGeom prst="line">
+            <a:avLst/>
+          </a:prstGeom>
+        </p:spPr>
+        <p:style>
+          <a:lnRef idx="1">
+            <a:schemeClr val="accent1"/>
+          </a:lnRef>
+          <a:fillRef idx="0">
+            <a:schemeClr val="accent1"/>
+          </a:fillRef>
+          <a:effectRef idx="0">
+            <a:schemeClr val="accent1"/>
+          </a:effectRef>
+          <a:fontRef idx="minor">
+            <a:schemeClr val="tx1"/>
+          </a:fontRef>
+        </p:style>
+      </p:cxnSp>
+      <p:sp>
+        <p:nvSpPr>
+          <p:cNvPr id="25" name="TextBox 24"/>
+          <p:cNvSpPr txBox="1"/>
+          <p:nvPr/>
+        </p:nvSpPr>
+        <p:spPr>
+          <a:xfrm>
+            <a:off x="2123728" y="4293096"/>
+            <a:ext cx="6567439" cy="523220"/>
+          </a:xfrm>
+          <a:prstGeom prst="rect">
+            <a:avLst/>
+          </a:prstGeom>
+          <a:noFill/>
+        </p:spPr>
+        <p:txBody>
+          <a:bodyPr wrap="none" rtlCol="0">
+            <a:spAutoFit/>
+          </a:bodyPr>
+          <a:lstStyle/>
+          <a:p>
+            <a:r>
+              <a:rPr lang="en-GB" sz="2800" dirty="0" smtClean="0">
+                <a:solidFill>
+                  <a:srgbClr val="00B050"/>
+                </a:solidFill>
+              </a:rPr>
+              <a:t>Notices the attached PDF and also links </a:t>
+            </a:r>
+            <a:r>
+              <a:rPr lang="en-GB" sz="2800" smtClean="0">
+                <a:solidFill>
+                  <a:srgbClr val="00B050"/>
+                </a:solidFill>
+              </a:rPr>
+              <a:t>to it</a:t>
+            </a:r>
+            <a:endParaRPr lang="en-GB" sz="2800" dirty="0">
+              <a:solidFill>
+                <a:srgbClr val="00B050"/>
+              </a:solidFill>
+            </a:endParaRPr>
+          </a:p>
+        </p:txBody>
+      </p:sp>
+      <p:pic>
+        <p:nvPicPr>
+          <p:cNvPr id="10" name="Picture 3" descr="C:\GITHUB\incodehq\incode-module-document\dom\src\main\java\org\incode\module\document\dom\impl\docs\Document-pdf.png"/>
+          <p:cNvPicPr>
+            <a:picLocks noChangeAspect="1" noChangeArrowheads="1"/>
+          </p:cNvPicPr>
+          <p:nvPr/>
+        </p:nvPicPr>
+        <p:blipFill>
+          <a:blip r:embed="rId3">
+            <a:extLst>
+              <a:ext uri="{28A0092B-C50C-407E-A947-70E740481C1C}">
+                <a14:useLocalDpi xmlns:a14="http://schemas.microsoft.com/office/drawing/2010/main" val="0"/>
+              </a:ext>
+            </a:extLst>
+          </a:blip>
+          <a:srcRect/>
+          <a:stretch>
+            <a:fillRect/>
+          </a:stretch>
+        </p:blipFill>
+        <p:spPr bwMode="auto">
+          <a:xfrm>
+            <a:off x="2363960" y="2546588"/>
+            <a:ext cx="916260" cy="916260"/>
+          </a:xfrm>
+          <a:prstGeom prst="rect">
+            <a:avLst/>
+          </a:prstGeom>
+          <a:noFill/>
+          <a:extLst>
+            <a:ext uri="{909E8E84-426E-40DD-AFC4-6F175D3DCCD1}">
+              <a14:hiddenFill xmlns:a14="http://schemas.microsoft.com/office/drawing/2010/main">
+                <a:solidFill>
+                  <a:srgbClr val="FFFFFF"/>
+                </a:solidFill>
+              </a14:hiddenFill>
+            </a:ext>
+          </a:extLst>
+        </p:spPr>
+      </p:pic>
+      <p:sp>
+        <p:nvSpPr>
+          <p:cNvPr id="11" name="TextBox 10"/>
+          <p:cNvSpPr txBox="1"/>
+          <p:nvPr/>
+        </p:nvSpPr>
+        <p:spPr>
+          <a:xfrm>
+            <a:off x="2372135" y="3484433"/>
+            <a:ext cx="1165191" cy="646331"/>
+          </a:xfrm>
+          <a:prstGeom prst="rect">
+            <a:avLst/>
+          </a:prstGeom>
+          <a:noFill/>
+        </p:spPr>
+        <p:txBody>
+          <a:bodyPr wrap="none" rtlCol="0">
+            <a:spAutoFit/>
+          </a:bodyPr>
+          <a:lstStyle/>
+          <a:p>
+            <a:r>
+              <a:rPr lang="en-GB" dirty="0" smtClean="0"/>
+              <a:t>(Invoice)</a:t>
+            </a:r>
+          </a:p>
+          <a:p>
+            <a:r>
+              <a:rPr lang="en-GB" dirty="0" smtClean="0"/>
+              <a:t>Document</a:t>
+            </a:r>
+            <a:endParaRPr lang="en-GB" dirty="0"/>
+          </a:p>
+        </p:txBody>
+      </p:sp>
+      <p:pic>
+        <p:nvPicPr>
+          <p:cNvPr id="12" name="Picture 4" descr="C:\GITHUB\incodehq\incode-module-document\dom\src\main\java\org\incode\module\document\dom\impl\paperclips\Paperclip.png"/>
+          <p:cNvPicPr>
+            <a:picLocks noChangeAspect="1" noChangeArrowheads="1"/>
+          </p:cNvPicPr>
+          <p:nvPr/>
+        </p:nvPicPr>
+        <p:blipFill>
+          <a:blip r:embed="rId4">
+            <a:extLst>
+              <a:ext uri="{28A0092B-C50C-407E-A947-70E740481C1C}">
+                <a14:useLocalDpi xmlns:a14="http://schemas.microsoft.com/office/drawing/2010/main" val="0"/>
+              </a:ext>
+            </a:extLst>
+          </a:blip>
+          <a:srcRect/>
+          <a:stretch>
+            <a:fillRect/>
+          </a:stretch>
+        </p:blipFill>
+        <p:spPr bwMode="auto">
+          <a:xfrm>
+            <a:off x="1331640" y="1667682"/>
+            <a:ext cx="518865" cy="518865"/>
+          </a:xfrm>
+          <a:prstGeom prst="rect">
+            <a:avLst/>
+          </a:prstGeom>
+          <a:noFill/>
+          <a:extLst>
+            <a:ext uri="{909E8E84-426E-40DD-AFC4-6F175D3DCCD1}">
+              <a14:hiddenFill xmlns:a14="http://schemas.microsoft.com/office/drawing/2010/main">
+                <a:solidFill>
+                  <a:srgbClr val="FFFFFF"/>
+                </a:solidFill>
+              </a14:hiddenFill>
+            </a:ext>
+          </a:extLst>
+        </p:spPr>
+      </p:pic>
+      <p:cxnSp>
+        <p:nvCxnSpPr>
+          <p:cNvPr id="15" name="Straight Connector 14"/>
+          <p:cNvCxnSpPr/>
+          <p:nvPr/>
+        </p:nvCxnSpPr>
+        <p:spPr>
+          <a:xfrm>
+            <a:off x="1074830" y="1387561"/>
+            <a:ext cx="1048898" cy="1015011"/>
+          </a:xfrm>
+          <a:prstGeom prst="line">
+            <a:avLst/>
+          </a:prstGeom>
+        </p:spPr>
+        <p:style>
+          <a:lnRef idx="1">
+            <a:schemeClr val="accent1"/>
+          </a:lnRef>
+          <a:fillRef idx="0">
+            <a:schemeClr val="accent1"/>
+          </a:fillRef>
+          <a:effectRef idx="0">
+            <a:schemeClr val="accent1"/>
+          </a:effectRef>
+          <a:fontRef idx="minor">
+            <a:schemeClr val="tx1"/>
+          </a:fontRef>
+        </p:style>
+      </p:cxnSp>
+      <p:cxnSp>
+        <p:nvCxnSpPr>
+          <p:cNvPr id="16" name="Straight Connector 15"/>
+          <p:cNvCxnSpPr/>
+          <p:nvPr/>
+        </p:nvCxnSpPr>
+        <p:spPr>
+          <a:xfrm>
+            <a:off x="1227230" y="1539961"/>
+            <a:ext cx="1048898" cy="1015011"/>
+          </a:xfrm>
+          <a:prstGeom prst="line">
+            <a:avLst/>
+          </a:prstGeom>
+        </p:spPr>
+        <p:style>
+          <a:lnRef idx="1">
+            <a:schemeClr val="accent1"/>
+          </a:lnRef>
+          <a:fillRef idx="0">
+            <a:schemeClr val="accent1"/>
+          </a:fillRef>
+          <a:effectRef idx="0">
+            <a:schemeClr val="accent1"/>
+          </a:effectRef>
+          <a:fontRef idx="minor">
+            <a:schemeClr val="tx1"/>
+          </a:fontRef>
+        </p:style>
+      </p:cxnSp>
+      <p:pic>
+        <p:nvPicPr>
+          <p:cNvPr id="17" name="Picture 4" descr="C:\GITHUB\incodehq\incode-module-document\dom\src\main\java\org\incode\module\document\dom\impl\paperclips\Paperclip.png"/>
+          <p:cNvPicPr>
+            <a:picLocks noChangeAspect="1" noChangeArrowheads="1"/>
+          </p:cNvPicPr>
+          <p:nvPr/>
+        </p:nvPicPr>
+        <p:blipFill>
+          <a:blip r:embed="rId4">
+            <a:extLst>
+              <a:ext uri="{28A0092B-C50C-407E-A947-70E740481C1C}">
+                <a14:useLocalDpi xmlns:a14="http://schemas.microsoft.com/office/drawing/2010/main" val="0"/>
+              </a:ext>
+            </a:extLst>
+          </a:blip>
+          <a:srcRect/>
+          <a:stretch>
+            <a:fillRect/>
+          </a:stretch>
+        </p:blipFill>
+        <p:spPr bwMode="auto">
+          <a:xfrm>
+            <a:off x="1619505" y="3906829"/>
+            <a:ext cx="518865" cy="518865"/>
+          </a:xfrm>
+          <a:prstGeom prst="rect">
+            <a:avLst/>
+          </a:prstGeom>
+          <a:noFill/>
+          <a:extLst>
+            <a:ext uri="{909E8E84-426E-40DD-AFC4-6F175D3DCCD1}">
+              <a14:hiddenFill xmlns:a14="http://schemas.microsoft.com/office/drawing/2010/main">
+                <a:solidFill>
+                  <a:srgbClr val="FFFFFF"/>
+                </a:solidFill>
+              </a14:hiddenFill>
+            </a:ext>
+          </a:extLst>
+        </p:spPr>
+      </p:pic>
+      <p:cxnSp>
+        <p:nvCxnSpPr>
+          <p:cNvPr id="18" name="Straight Connector 17"/>
+          <p:cNvCxnSpPr/>
+          <p:nvPr/>
+        </p:nvCxnSpPr>
+        <p:spPr>
+          <a:xfrm flipH="1">
+            <a:off x="1362695" y="3626708"/>
+            <a:ext cx="1048898" cy="1015011"/>
+          </a:xfrm>
+          <a:prstGeom prst="line">
+            <a:avLst/>
+          </a:prstGeom>
+        </p:spPr>
+        <p:style>
+          <a:lnRef idx="1">
+            <a:schemeClr val="accent1"/>
+          </a:lnRef>
+          <a:fillRef idx="0">
+            <a:schemeClr val="accent1"/>
+          </a:fillRef>
+          <a:effectRef idx="0">
+            <a:schemeClr val="accent1"/>
+          </a:effectRef>
+          <a:fontRef idx="minor">
+            <a:schemeClr val="tx1"/>
+          </a:fontRef>
+        </p:style>
+      </p:cxnSp>
+    </p:spTree>
+    <p:extLst>
+      <p:ext uri="{BB962C8B-B14F-4D97-AF65-F5344CB8AC3E}">
+        <p14:creationId xmlns:p14="http://schemas.microsoft.com/office/powerpoint/2010/main" val="775045194"/>
+      </p:ext>
+    </p:extLst>
+  </p:cSld>
+  <p:clrMapOvr>
+    <a:masterClrMapping/>
+  </p:clrMapOvr>
+  <p:timing>
+    <p:tnLst>
+      <p:par>
+        <p:cTn id="1" dur="indefinite" restart="never" nodeType="tmRoot"/>
+      </p:par>
+    </p:tnLst>
+  </p:timing>
+</p:sld>
+</file>
+
+<file path=ppt/slides/slide16.xml><?xml version="1.0" encoding="utf-8"?>
+<p:sld xmlns:a="http://schemas.openxmlformats.org/drawingml/2006/main" xmlns:r="http://schemas.openxmlformats.org/officeDocument/2006/relationships" xmlns:p="http://schemas.openxmlformats.org/presentationml/2006/main">
+  <p:cSld>
+    <p:spTree>
+      <p:nvGrpSpPr>
+        <p:cNvPr id="1" name=""/>
+        <p:cNvGrpSpPr/>
+        <p:nvPr/>
+      </p:nvGrpSpPr>
+      <p:grpSpPr>
+        <a:xfrm>
+          <a:off x="0" y="0"/>
+          <a:ext cx="0" cy="0"/>
+          <a:chOff x="0" y="0"/>
+          <a:chExt cx="0" cy="0"/>
+        </a:xfrm>
+      </p:grpSpPr>
+      <p:pic>
+        <p:nvPicPr>
+          <p:cNvPr id="1026" name="Picture 2" descr="C:\GITHUB\estatio\estatio\estatioapp\module\invoice\dom\src\main\java\org\estatio\dom\invoice\Invoice.png"/>
+          <p:cNvPicPr>
+            <a:picLocks noChangeAspect="1" noChangeArrowheads="1"/>
+          </p:cNvPicPr>
+          <p:nvPr/>
+        </p:nvPicPr>
+        <p:blipFill>
+          <a:blip r:embed="rId2">
+            <a:extLst>
+              <a:ext uri="{28A0092B-C50C-407E-A947-70E740481C1C}">
+                <a14:useLocalDpi xmlns:a14="http://schemas.microsoft.com/office/drawing/2010/main" val="0"/>
+              </a:ext>
+            </a:extLst>
+          </a:blip>
+          <a:srcRect/>
+          <a:stretch>
+            <a:fillRect/>
+          </a:stretch>
+        </p:blipFill>
+        <p:spPr bwMode="auto">
+          <a:xfrm>
+            <a:off x="211895" y="332656"/>
+            <a:ext cx="916260" cy="916260"/>
+          </a:xfrm>
+          <a:prstGeom prst="rect">
+            <a:avLst/>
+          </a:prstGeom>
+          <a:noFill/>
+          <a:extLst>
+            <a:ext uri="{909E8E84-426E-40DD-AFC4-6F175D3DCCD1}">
+              <a14:hiddenFill xmlns:a14="http://schemas.microsoft.com/office/drawing/2010/main">
+                <a:solidFill>
+                  <a:srgbClr val="FFFFFF"/>
+                </a:solidFill>
+              </a14:hiddenFill>
+            </a:ext>
+          </a:extLst>
+        </p:spPr>
+      </p:pic>
+      <p:sp>
+        <p:nvSpPr>
+          <p:cNvPr id="9" name="TextBox 8"/>
+          <p:cNvSpPr txBox="1"/>
+          <p:nvPr/>
+        </p:nvSpPr>
+        <p:spPr>
+          <a:xfrm>
+            <a:off x="1140729" y="332656"/>
+            <a:ext cx="850361" cy="369332"/>
+          </a:xfrm>
+          <a:prstGeom prst="rect">
+            <a:avLst/>
+          </a:prstGeom>
+          <a:noFill/>
+        </p:spPr>
+        <p:txBody>
+          <a:bodyPr wrap="none" rtlCol="0">
+            <a:spAutoFit/>
+          </a:bodyPr>
+          <a:lstStyle/>
+          <a:p>
+            <a:r>
+              <a:rPr lang="en-GB" dirty="0" smtClean="0"/>
+              <a:t>Invoice</a:t>
+            </a:r>
+            <a:endParaRPr lang="en-GB" dirty="0"/>
+          </a:p>
+        </p:txBody>
+      </p:sp>
+      <p:pic>
+        <p:nvPicPr>
+          <p:cNvPr id="1027" name="Picture 3" descr="C:\GITHUB\incodehq\incode-module-document\dom\src\main\java\org\incode\module\document\dom\impl\docs\Document-pdf.png"/>
+          <p:cNvPicPr>
+            <a:picLocks noChangeAspect="1" noChangeArrowheads="1"/>
+          </p:cNvPicPr>
+          <p:nvPr/>
+        </p:nvPicPr>
+        <p:blipFill>
+          <a:blip r:embed="rId3">
+            <a:extLst>
+              <a:ext uri="{28A0092B-C50C-407E-A947-70E740481C1C}">
+                <a14:useLocalDpi xmlns:a14="http://schemas.microsoft.com/office/drawing/2010/main" val="0"/>
+              </a:ext>
+            </a:extLst>
+          </a:blip>
+          <a:srcRect/>
+          <a:stretch>
+            <a:fillRect/>
+          </a:stretch>
+        </p:blipFill>
+        <p:spPr bwMode="auto">
+          <a:xfrm>
+            <a:off x="2363960" y="2546588"/>
+            <a:ext cx="916260" cy="916260"/>
+          </a:xfrm>
+          <a:prstGeom prst="rect">
+            <a:avLst/>
+          </a:prstGeom>
+          <a:noFill/>
+          <a:extLst>
+            <a:ext uri="{909E8E84-426E-40DD-AFC4-6F175D3DCCD1}">
+              <a14:hiddenFill xmlns:a14="http://schemas.microsoft.com/office/drawing/2010/main">
+                <a:solidFill>
+                  <a:srgbClr val="FFFFFF"/>
+                </a:solidFill>
+              </a14:hiddenFill>
+            </a:ext>
+          </a:extLst>
+        </p:spPr>
+      </p:pic>
+      <p:sp>
+        <p:nvSpPr>
+          <p:cNvPr id="12" name="TextBox 11"/>
+          <p:cNvSpPr txBox="1"/>
+          <p:nvPr/>
+        </p:nvSpPr>
+        <p:spPr>
+          <a:xfrm>
+            <a:off x="2372135" y="3484433"/>
+            <a:ext cx="1165191" cy="646331"/>
+          </a:xfrm>
+          <a:prstGeom prst="rect">
+            <a:avLst/>
+          </a:prstGeom>
+          <a:noFill/>
+        </p:spPr>
+        <p:txBody>
+          <a:bodyPr wrap="none" rtlCol="0">
+            <a:spAutoFit/>
+          </a:bodyPr>
+          <a:lstStyle/>
+          <a:p>
+            <a:r>
+              <a:rPr lang="en-GB" dirty="0" smtClean="0"/>
+              <a:t>(Invoice)</a:t>
+            </a:r>
+          </a:p>
+          <a:p>
+            <a:r>
+              <a:rPr lang="en-GB" dirty="0" smtClean="0"/>
+              <a:t>Document</a:t>
+            </a:r>
+            <a:endParaRPr lang="en-GB" dirty="0"/>
+          </a:p>
+        </p:txBody>
+      </p:sp>
+      <p:pic>
+        <p:nvPicPr>
+          <p:cNvPr id="13" name="Picture 3" descr="C:\GITHUB\incodehq\incode-module-document\dom\src\main\java\org\incode\module\document\dom\impl\docs\Document-pdf.png"/>
+          <p:cNvPicPr>
+            <a:picLocks noChangeAspect="1" noChangeArrowheads="1"/>
+          </p:cNvPicPr>
+          <p:nvPr/>
+        </p:nvPicPr>
+        <p:blipFill>
+          <a:blip r:embed="rId3">
+            <a:extLst>
+              <a:ext uri="{28A0092B-C50C-407E-A947-70E740481C1C}">
+                <a14:useLocalDpi xmlns:a14="http://schemas.microsoft.com/office/drawing/2010/main" val="0"/>
+              </a:ext>
+            </a:extLst>
+          </a:blip>
+          <a:srcRect/>
+          <a:stretch>
+            <a:fillRect/>
+          </a:stretch>
+        </p:blipFill>
+        <p:spPr bwMode="auto">
+          <a:xfrm>
+            <a:off x="827584" y="4785735"/>
+            <a:ext cx="916260" cy="916260"/>
+          </a:xfrm>
+          <a:prstGeom prst="rect">
+            <a:avLst/>
+          </a:prstGeom>
+          <a:noFill/>
+          <a:extLst>
+            <a:ext uri="{909E8E84-426E-40DD-AFC4-6F175D3DCCD1}">
+              <a14:hiddenFill xmlns:a14="http://schemas.microsoft.com/office/drawing/2010/main">
+                <a:solidFill>
+                  <a:srgbClr val="FFFFFF"/>
+                </a:solidFill>
+              </a14:hiddenFill>
+            </a:ext>
+          </a:extLst>
+        </p:spPr>
+      </p:pic>
+      <p:sp>
+        <p:nvSpPr>
+          <p:cNvPr id="14" name="TextBox 13"/>
+          <p:cNvSpPr txBox="1"/>
+          <p:nvPr/>
+        </p:nvSpPr>
+        <p:spPr>
+          <a:xfrm>
+            <a:off x="715951" y="5733913"/>
+            <a:ext cx="1337097" cy="646331"/>
+          </a:xfrm>
+          <a:prstGeom prst="rect">
+            <a:avLst/>
+          </a:prstGeom>
+          <a:noFill/>
+        </p:spPr>
+        <p:txBody>
+          <a:bodyPr wrap="none" rtlCol="0">
+            <a:spAutoFit/>
+          </a:bodyPr>
+          <a:lstStyle/>
+          <a:p>
+            <a:pPr algn="ctr"/>
+            <a:r>
+              <a:rPr lang="en-GB" dirty="0" smtClean="0"/>
+              <a:t>(Tax receipt)</a:t>
+            </a:r>
+          </a:p>
+          <a:p>
+            <a:pPr algn="ctr"/>
+            <a:r>
+              <a:rPr lang="en-GB" dirty="0" smtClean="0"/>
+              <a:t>Document</a:t>
+            </a:r>
+            <a:endParaRPr lang="en-GB" dirty="0"/>
+          </a:p>
+        </p:txBody>
+      </p:sp>
+      <p:pic>
+        <p:nvPicPr>
+          <p:cNvPr id="1028" name="Picture 4" descr="C:\GITHUB\incodehq\incode-module-document\dom\src\main\java\org\incode\module\document\dom\impl\paperclips\Paperclip.png"/>
+          <p:cNvPicPr>
+            <a:picLocks noChangeAspect="1" noChangeArrowheads="1"/>
+          </p:cNvPicPr>
+          <p:nvPr/>
+        </p:nvPicPr>
+        <p:blipFill>
+          <a:blip r:embed="rId4">
+            <a:extLst>
+              <a:ext uri="{28A0092B-C50C-407E-A947-70E740481C1C}">
+                <a14:useLocalDpi xmlns:a14="http://schemas.microsoft.com/office/drawing/2010/main" val="0"/>
+              </a:ext>
+            </a:extLst>
+          </a:blip>
+          <a:srcRect/>
+          <a:stretch>
+            <a:fillRect/>
+          </a:stretch>
+        </p:blipFill>
+        <p:spPr bwMode="auto">
+          <a:xfrm>
+            <a:off x="1331640" y="1667682"/>
+            <a:ext cx="518865" cy="518865"/>
+          </a:xfrm>
+          <a:prstGeom prst="rect">
+            <a:avLst/>
+          </a:prstGeom>
+          <a:noFill/>
+          <a:extLst>
+            <a:ext uri="{909E8E84-426E-40DD-AFC4-6F175D3DCCD1}">
+              <a14:hiddenFill xmlns:a14="http://schemas.microsoft.com/office/drawing/2010/main">
+                <a:solidFill>
+                  <a:srgbClr val="FFFFFF"/>
+                </a:solidFill>
+              </a14:hiddenFill>
+            </a:ext>
+          </a:extLst>
+        </p:spPr>
+      </p:pic>
+      <p:cxnSp>
+        <p:nvCxnSpPr>
+          <p:cNvPr id="11" name="Straight Connector 10"/>
+          <p:cNvCxnSpPr/>
+          <p:nvPr/>
+        </p:nvCxnSpPr>
+        <p:spPr>
+          <a:xfrm>
+            <a:off x="1074830" y="1387561"/>
+            <a:ext cx="1048898" cy="1015011"/>
+          </a:xfrm>
+          <a:prstGeom prst="line">
+            <a:avLst/>
+          </a:prstGeom>
+        </p:spPr>
+        <p:style>
+          <a:lnRef idx="1">
+            <a:schemeClr val="accent1"/>
+          </a:lnRef>
+          <a:fillRef idx="0">
+            <a:schemeClr val="accent1"/>
+          </a:fillRef>
+          <a:effectRef idx="0">
+            <a:schemeClr val="accent1"/>
+          </a:effectRef>
+          <a:fontRef idx="minor">
+            <a:schemeClr val="tx1"/>
+          </a:fontRef>
+        </p:style>
+      </p:cxnSp>
+      <p:pic>
+        <p:nvPicPr>
+          <p:cNvPr id="20" name="Picture 4" descr="C:\GITHUB\incodehq\incode-module-document\dom\src\main\java\org\incode\module\document\dom\impl\paperclips\Paperclip.png"/>
+          <p:cNvPicPr>
+            <a:picLocks noChangeAspect="1" noChangeArrowheads="1"/>
+          </p:cNvPicPr>
+          <p:nvPr/>
+        </p:nvPicPr>
+        <p:blipFill>
+          <a:blip r:embed="rId4">
+            <a:extLst>
+              <a:ext uri="{28A0092B-C50C-407E-A947-70E740481C1C}">
+                <a14:useLocalDpi xmlns:a14="http://schemas.microsoft.com/office/drawing/2010/main" val="0"/>
+              </a:ext>
+            </a:extLst>
+          </a:blip>
+          <a:srcRect/>
+          <a:stretch>
+            <a:fillRect/>
+          </a:stretch>
+        </p:blipFill>
+        <p:spPr bwMode="auto">
+          <a:xfrm>
+            <a:off x="1619505" y="3906829"/>
+            <a:ext cx="518865" cy="518865"/>
+          </a:xfrm>
+          <a:prstGeom prst="rect">
+            <a:avLst/>
+          </a:prstGeom>
+          <a:noFill/>
+          <a:extLst>
+            <a:ext uri="{909E8E84-426E-40DD-AFC4-6F175D3DCCD1}">
+              <a14:hiddenFill xmlns:a14="http://schemas.microsoft.com/office/drawing/2010/main">
+                <a:solidFill>
+                  <a:srgbClr val="FFFFFF"/>
+                </a:solidFill>
+              </a14:hiddenFill>
+            </a:ext>
+          </a:extLst>
+        </p:spPr>
+      </p:pic>
+      <p:cxnSp>
+        <p:nvCxnSpPr>
+          <p:cNvPr id="21" name="Straight Connector 20"/>
+          <p:cNvCxnSpPr/>
+          <p:nvPr/>
+        </p:nvCxnSpPr>
+        <p:spPr>
+          <a:xfrm flipH="1">
+            <a:off x="1362695" y="3626708"/>
+            <a:ext cx="1048898" cy="1015011"/>
+          </a:xfrm>
+          <a:prstGeom prst="line">
+            <a:avLst/>
+          </a:prstGeom>
+        </p:spPr>
+        <p:style>
+          <a:lnRef idx="1">
+            <a:schemeClr val="accent1"/>
+          </a:lnRef>
+          <a:fillRef idx="0">
+            <a:schemeClr val="accent1"/>
+          </a:fillRef>
+          <a:effectRef idx="0">
+            <a:schemeClr val="accent1"/>
+          </a:effectRef>
+          <a:fontRef idx="minor">
+            <a:schemeClr val="tx1"/>
+          </a:fontRef>
+        </p:style>
+      </p:cxnSp>
+      <p:pic>
+        <p:nvPicPr>
+          <p:cNvPr id="1029" name="Picture 5" descr="C:\GITHUB\incodehq\incode-module-communications\module\src\main\java\org\incode\module\communications\dom\impl\comms\Communication-email.png"/>
+          <p:cNvPicPr>
+            <a:picLocks noChangeAspect="1" noChangeArrowheads="1"/>
+          </p:cNvPicPr>
+          <p:nvPr/>
+        </p:nvPicPr>
+        <p:blipFill>
+          <a:blip r:embed="rId5">
+            <a:extLst>
+              <a:ext uri="{28A0092B-C50C-407E-A947-70E740481C1C}">
+                <a14:useLocalDpi xmlns:a14="http://schemas.microsoft.com/office/drawing/2010/main" val="0"/>
+              </a:ext>
+            </a:extLst>
+          </a:blip>
+          <a:srcRect/>
+          <a:stretch>
+            <a:fillRect/>
+          </a:stretch>
+        </p:blipFill>
+        <p:spPr bwMode="auto">
+          <a:xfrm>
+            <a:off x="6732240" y="2449322"/>
+            <a:ext cx="1163127" cy="1163127"/>
+          </a:xfrm>
+          <a:prstGeom prst="rect">
+            <a:avLst/>
+          </a:prstGeom>
+          <a:noFill/>
+          <a:extLst>
+            <a:ext uri="{909E8E84-426E-40DD-AFC4-6F175D3DCCD1}">
+              <a14:hiddenFill xmlns:a14="http://schemas.microsoft.com/office/drawing/2010/main">
+                <a:solidFill>
+                  <a:srgbClr val="FFFFFF"/>
+                </a:solidFill>
+              </a14:hiddenFill>
+            </a:ext>
+          </a:extLst>
+        </p:spPr>
+      </p:pic>
+      <p:sp>
+        <p:nvSpPr>
+          <p:cNvPr id="24" name="TextBox 23"/>
+          <p:cNvSpPr txBox="1"/>
+          <p:nvPr/>
+        </p:nvSpPr>
+        <p:spPr>
+          <a:xfrm>
+            <a:off x="6643394" y="3410684"/>
+            <a:ext cx="1673022" cy="646331"/>
+          </a:xfrm>
+          <a:prstGeom prst="rect">
+            <a:avLst/>
+          </a:prstGeom>
+          <a:noFill/>
+        </p:spPr>
+        <p:txBody>
+          <a:bodyPr wrap="none" rtlCol="0">
+            <a:spAutoFit/>
+          </a:bodyPr>
+          <a:lstStyle/>
+          <a:p>
+            <a:r>
+              <a:rPr lang="en-GB" dirty="0" smtClean="0"/>
+              <a:t>(Post)</a:t>
+            </a:r>
+          </a:p>
+          <a:p>
+            <a:r>
+              <a:rPr lang="en-GB" dirty="0" smtClean="0"/>
+              <a:t>Communication</a:t>
+            </a:r>
+            <a:endParaRPr lang="en-GB" dirty="0"/>
+          </a:p>
+        </p:txBody>
+      </p:sp>
+      <p:pic>
+        <p:nvPicPr>
+          <p:cNvPr id="27" name="Picture 4" descr="C:\GITHUB\incodehq\incode-module-document\dom\src\main\java\org\incode\module\document\dom\impl\paperclips\Paperclip.png"/>
+          <p:cNvPicPr>
+            <a:picLocks noChangeAspect="1" noChangeArrowheads="1"/>
+          </p:cNvPicPr>
+          <p:nvPr/>
+        </p:nvPicPr>
+        <p:blipFill>
+          <a:blip r:embed="rId4">
+            <a:extLst>
+              <a:ext uri="{28A0092B-C50C-407E-A947-70E740481C1C}">
+                <a14:useLocalDpi xmlns:a14="http://schemas.microsoft.com/office/drawing/2010/main" val="0"/>
+              </a:ext>
+            </a:extLst>
+          </a:blip>
+          <a:srcRect/>
+          <a:stretch>
+            <a:fillRect/>
+          </a:stretch>
+        </p:blipFill>
+        <p:spPr bwMode="auto">
+          <a:xfrm>
+            <a:off x="4460367" y="2766119"/>
+            <a:ext cx="518865" cy="518865"/>
+          </a:xfrm>
+          <a:prstGeom prst="rect">
+            <a:avLst/>
+          </a:prstGeom>
+          <a:noFill/>
+          <a:extLst>
+            <a:ext uri="{909E8E84-426E-40DD-AFC4-6F175D3DCCD1}">
+              <a14:hiddenFill xmlns:a14="http://schemas.microsoft.com/office/drawing/2010/main">
+                <a:solidFill>
+                  <a:srgbClr val="FFFFFF"/>
+                </a:solidFill>
+              </a14:hiddenFill>
+            </a:ext>
+          </a:extLst>
+        </p:spPr>
+      </p:pic>
+      <p:cxnSp>
+        <p:nvCxnSpPr>
+          <p:cNvPr id="29" name="Straight Connector 28"/>
+          <p:cNvCxnSpPr/>
+          <p:nvPr/>
+        </p:nvCxnSpPr>
+        <p:spPr>
+          <a:xfrm>
+            <a:off x="1227230" y="1539961"/>
+            <a:ext cx="1048898" cy="1015011"/>
+          </a:xfrm>
+          <a:prstGeom prst="line">
+            <a:avLst/>
+          </a:prstGeom>
+        </p:spPr>
+        <p:style>
+          <a:lnRef idx="1">
+            <a:schemeClr val="accent1"/>
+          </a:lnRef>
+          <a:fillRef idx="0">
+            <a:schemeClr val="accent1"/>
+          </a:fillRef>
+          <a:effectRef idx="0">
+            <a:schemeClr val="accent1"/>
+          </a:effectRef>
+          <a:fontRef idx="minor">
+            <a:schemeClr val="tx1"/>
+          </a:fontRef>
+        </p:style>
+      </p:cxnSp>
+      <p:cxnSp>
+        <p:nvCxnSpPr>
+          <p:cNvPr id="30" name="Straight Connector 29"/>
+          <p:cNvCxnSpPr/>
+          <p:nvPr/>
+        </p:nvCxnSpPr>
+        <p:spPr>
+          <a:xfrm>
+            <a:off x="3380247" y="3004718"/>
+            <a:ext cx="3096344" cy="26167"/>
+          </a:xfrm>
+          <a:prstGeom prst="line">
+            <a:avLst/>
+          </a:prstGeom>
+        </p:spPr>
+        <p:style>
+          <a:lnRef idx="1">
+            <a:schemeClr val="accent1"/>
+          </a:lnRef>
+          <a:fillRef idx="0">
+            <a:schemeClr val="accent1"/>
+          </a:fillRef>
+          <a:effectRef idx="0">
+            <a:schemeClr val="accent1"/>
+          </a:effectRef>
+          <a:fontRef idx="minor">
+            <a:schemeClr val="tx1"/>
+          </a:fontRef>
+        </p:style>
+      </p:cxnSp>
+      <p:pic>
+        <p:nvPicPr>
+          <p:cNvPr id="25" name="Picture 4" descr="C:\GITHUB\incodehq\incode-module-document\dom\src\main\java\org\incode\module\document\dom\impl\paperclips\Paperclip.png"/>
+          <p:cNvPicPr>
+            <a:picLocks noChangeAspect="1" noChangeArrowheads="1"/>
+          </p:cNvPicPr>
+          <p:nvPr/>
+        </p:nvPicPr>
+        <p:blipFill>
+          <a:blip r:embed="rId4">
+            <a:extLst>
+              <a:ext uri="{28A0092B-C50C-407E-A947-70E740481C1C}">
+                <a14:useLocalDpi xmlns:a14="http://schemas.microsoft.com/office/drawing/2010/main" val="0"/>
+              </a:ext>
+            </a:extLst>
+          </a:blip>
+          <a:srcRect/>
+          <a:stretch>
+            <a:fillRect/>
+          </a:stretch>
+        </p:blipFill>
+        <p:spPr bwMode="auto">
+          <a:xfrm>
+            <a:off x="3596601" y="4206279"/>
+            <a:ext cx="518865" cy="518865"/>
+          </a:xfrm>
+          <a:prstGeom prst="rect">
+            <a:avLst/>
+          </a:prstGeom>
+          <a:noFill/>
+          <a:extLst>
+            <a:ext uri="{909E8E84-426E-40DD-AFC4-6F175D3DCCD1}">
+              <a14:hiddenFill xmlns:a14="http://schemas.microsoft.com/office/drawing/2010/main">
+                <a:solidFill>
+                  <a:srgbClr val="FFFFFF"/>
+                </a:solidFill>
+              </a14:hiddenFill>
+            </a:ext>
+          </a:extLst>
+        </p:spPr>
+      </p:pic>
+      <p:cxnSp>
+        <p:nvCxnSpPr>
+          <p:cNvPr id="31" name="Straight Connector 30"/>
+          <p:cNvCxnSpPr/>
+          <p:nvPr/>
+        </p:nvCxnSpPr>
+        <p:spPr>
+          <a:xfrm flipV="1">
+            <a:off x="2053048" y="3337233"/>
+            <a:ext cx="4391160" cy="1890007"/>
+          </a:xfrm>
+          <a:prstGeom prst="line">
+            <a:avLst/>
+          </a:prstGeom>
+        </p:spPr>
+        <p:style>
+          <a:lnRef idx="1">
+            <a:schemeClr val="accent1"/>
+          </a:lnRef>
+          <a:fillRef idx="0">
+            <a:schemeClr val="accent1"/>
+          </a:fillRef>
+          <a:effectRef idx="0">
+            <a:schemeClr val="accent1"/>
+          </a:effectRef>
+          <a:fontRef idx="minor">
+            <a:schemeClr val="tx1"/>
+          </a:fontRef>
+        </p:style>
+      </p:cxnSp>
+      <p:sp>
+        <p:nvSpPr>
+          <p:cNvPr id="32" name="TextBox 31"/>
+          <p:cNvSpPr txBox="1"/>
+          <p:nvPr/>
+        </p:nvSpPr>
+        <p:spPr>
+          <a:xfrm>
+            <a:off x="3203848" y="188640"/>
+            <a:ext cx="2973250" cy="646331"/>
+          </a:xfrm>
+          <a:prstGeom prst="rect">
+            <a:avLst/>
+          </a:prstGeom>
+          <a:noFill/>
+        </p:spPr>
+        <p:txBody>
+          <a:bodyPr wrap="none" rtlCol="0">
+            <a:spAutoFit/>
+          </a:bodyPr>
+          <a:lstStyle/>
+          <a:p>
+            <a:r>
+              <a:rPr lang="en-GB" sz="3600" dirty="0" smtClean="0">
+                <a:solidFill>
+                  <a:srgbClr val="00B050"/>
+                </a:solidFill>
+              </a:rPr>
+              <a:t>“Send by Post”</a:t>
+            </a:r>
+            <a:endParaRPr lang="en-GB" sz="3600" dirty="0">
+              <a:solidFill>
+                <a:srgbClr val="00B050"/>
+              </a:solidFill>
+            </a:endParaRPr>
+          </a:p>
+        </p:txBody>
+      </p:sp>
+      <p:pic>
+        <p:nvPicPr>
+          <p:cNvPr id="22" name="Picture 4" descr="C:\GITHUB\incodehq\incode-module-document\dom\src\main\java\org\incode\module\document\dom\impl\paperclips\Paperclip.png"/>
+          <p:cNvPicPr>
+            <a:picLocks noChangeAspect="1" noChangeArrowheads="1"/>
+          </p:cNvPicPr>
+          <p:nvPr/>
+        </p:nvPicPr>
+        <p:blipFill>
+          <a:blip r:embed="rId4">
+            <a:extLst>
+              <a:ext uri="{28A0092B-C50C-407E-A947-70E740481C1C}">
+                <a14:useLocalDpi xmlns:a14="http://schemas.microsoft.com/office/drawing/2010/main" val="0"/>
+              </a:ext>
+            </a:extLst>
+          </a:blip>
+          <a:srcRect/>
+          <a:stretch>
+            <a:fillRect/>
+          </a:stretch>
+        </p:blipFill>
+        <p:spPr bwMode="auto">
+          <a:xfrm>
+            <a:off x="780858" y="2767814"/>
+            <a:ext cx="518865" cy="518865"/>
+          </a:xfrm>
+          <a:prstGeom prst="rect">
+            <a:avLst/>
+          </a:prstGeom>
+          <a:noFill/>
+          <a:extLst>
+            <a:ext uri="{909E8E84-426E-40DD-AFC4-6F175D3DCCD1}">
+              <a14:hiddenFill xmlns:a14="http://schemas.microsoft.com/office/drawing/2010/main">
+                <a:solidFill>
+                  <a:srgbClr val="FFFFFF"/>
+                </a:solidFill>
+              </a14:hiddenFill>
+            </a:ext>
+          </a:extLst>
+        </p:spPr>
+      </p:pic>
+      <p:cxnSp>
+        <p:nvCxnSpPr>
+          <p:cNvPr id="23" name="Straight Connector 22"/>
+          <p:cNvCxnSpPr/>
+          <p:nvPr/>
+        </p:nvCxnSpPr>
+        <p:spPr>
+          <a:xfrm>
+            <a:off x="827584" y="1412776"/>
+            <a:ext cx="535111" cy="3228943"/>
+          </a:xfrm>
+          <a:prstGeom prst="line">
+            <a:avLst/>
+          </a:prstGeom>
+        </p:spPr>
+        <p:style>
+          <a:lnRef idx="1">
+            <a:schemeClr val="accent1"/>
+          </a:lnRef>
+          <a:fillRef idx="0">
+            <a:schemeClr val="accent1"/>
+          </a:fillRef>
+          <a:effectRef idx="0">
+            <a:schemeClr val="accent1"/>
+          </a:effectRef>
+          <a:fontRef idx="minor">
+            <a:schemeClr val="tx1"/>
+          </a:fontRef>
+        </p:style>
+      </p:cxnSp>
+    </p:spTree>
+    <p:extLst>
+      <p:ext uri="{BB962C8B-B14F-4D97-AF65-F5344CB8AC3E}">
+        <p14:creationId xmlns:p14="http://schemas.microsoft.com/office/powerpoint/2010/main" val="4126229046"/>
+      </p:ext>
+    </p:extLst>
+  </p:cSld>
+  <p:clrMapOvr>
+    <a:masterClrMapping/>
+  </p:clrMapOvr>
+  <p:timing>
+    <p:tnLst>
+      <p:par>
+        <p:cTn id="1" dur="indefinite" restart="never" nodeType="tmRoot"/>
+      </p:par>
+    </p:tnLst>
+  </p:timing>
+</p:sld>
+</file>
+
+<file path=ppt/slides/slide17.xml><?xml version="1.0" encoding="utf-8"?>
+<p:sld xmlns:a="http://schemas.openxmlformats.org/drawingml/2006/main" xmlns:r="http://schemas.openxmlformats.org/officeDocument/2006/relationships" xmlns:p="http://schemas.openxmlformats.org/presentationml/2006/main">
+  <p:cSld>
+    <p:spTree>
+      <p:nvGrpSpPr>
+        <p:cNvPr id="1" name=""/>
+        <p:cNvGrpSpPr/>
+        <p:nvPr/>
+      </p:nvGrpSpPr>
+      <p:grpSpPr>
+        <a:xfrm>
+          <a:off x="0" y="0"/>
+          <a:ext cx="0" cy="0"/>
+          <a:chOff x="0" y="0"/>
+          <a:chExt cx="0" cy="0"/>
+        </a:xfrm>
+      </p:grpSpPr>
+      <p:pic>
+        <p:nvPicPr>
+          <p:cNvPr id="1026" name="Picture 2" descr="C:\GITHUB\estatio\estatio\estatioapp\module\invoice\dom\src\main\java\org\estatio\dom\invoice\Invoice.png"/>
+          <p:cNvPicPr>
+            <a:picLocks noChangeAspect="1" noChangeArrowheads="1"/>
+          </p:cNvPicPr>
+          <p:nvPr/>
+        </p:nvPicPr>
+        <p:blipFill>
+          <a:blip r:embed="rId2">
+            <a:extLst>
+              <a:ext uri="{28A0092B-C50C-407E-A947-70E740481C1C}">
+                <a14:useLocalDpi xmlns:a14="http://schemas.microsoft.com/office/drawing/2010/main" val="0"/>
+              </a:ext>
+            </a:extLst>
+          </a:blip>
+          <a:srcRect/>
+          <a:stretch>
+            <a:fillRect/>
+          </a:stretch>
+        </p:blipFill>
+        <p:spPr bwMode="auto">
+          <a:xfrm>
+            <a:off x="211895" y="332656"/>
+            <a:ext cx="916260" cy="916260"/>
+          </a:xfrm>
+          <a:prstGeom prst="rect">
+            <a:avLst/>
+          </a:prstGeom>
+          <a:noFill/>
+          <a:extLst>
+            <a:ext uri="{909E8E84-426E-40DD-AFC4-6F175D3DCCD1}">
+              <a14:hiddenFill xmlns:a14="http://schemas.microsoft.com/office/drawing/2010/main">
+                <a:solidFill>
+                  <a:srgbClr val="FFFFFF"/>
+                </a:solidFill>
+              </a14:hiddenFill>
+            </a:ext>
+          </a:extLst>
+        </p:spPr>
+      </p:pic>
+      <p:sp>
+        <p:nvSpPr>
+          <p:cNvPr id="9" name="TextBox 8"/>
+          <p:cNvSpPr txBox="1"/>
+          <p:nvPr/>
+        </p:nvSpPr>
+        <p:spPr>
+          <a:xfrm>
+            <a:off x="1140729" y="332656"/>
+            <a:ext cx="850361" cy="369332"/>
+          </a:xfrm>
+          <a:prstGeom prst="rect">
+            <a:avLst/>
+          </a:prstGeom>
+          <a:noFill/>
+        </p:spPr>
+        <p:txBody>
+          <a:bodyPr wrap="none" rtlCol="0">
+            <a:spAutoFit/>
+          </a:bodyPr>
+          <a:lstStyle/>
+          <a:p>
+            <a:r>
+              <a:rPr lang="en-GB" dirty="0" smtClean="0"/>
+              <a:t>Invoice</a:t>
+            </a:r>
+            <a:endParaRPr lang="en-GB" dirty="0"/>
+          </a:p>
+        </p:txBody>
+      </p:sp>
+      <p:pic>
+        <p:nvPicPr>
+          <p:cNvPr id="1027" name="Picture 3" descr="C:\GITHUB\incodehq\incode-module-document\dom\src\main\java\org\incode\module\document\dom\impl\docs\Document-pdf.png"/>
+          <p:cNvPicPr>
+            <a:picLocks noChangeAspect="1" noChangeArrowheads="1"/>
+          </p:cNvPicPr>
+          <p:nvPr/>
+        </p:nvPicPr>
+        <p:blipFill>
+          <a:blip r:embed="rId3">
+            <a:extLst>
+              <a:ext uri="{28A0092B-C50C-407E-A947-70E740481C1C}">
+                <a14:useLocalDpi xmlns:a14="http://schemas.microsoft.com/office/drawing/2010/main" val="0"/>
+              </a:ext>
+            </a:extLst>
+          </a:blip>
+          <a:srcRect/>
+          <a:stretch>
+            <a:fillRect/>
+          </a:stretch>
+        </p:blipFill>
+        <p:spPr bwMode="auto">
+          <a:xfrm>
+            <a:off x="2363960" y="2546588"/>
+            <a:ext cx="916260" cy="916260"/>
+          </a:xfrm>
+          <a:prstGeom prst="rect">
+            <a:avLst/>
+          </a:prstGeom>
+          <a:noFill/>
+          <a:extLst>
+            <a:ext uri="{909E8E84-426E-40DD-AFC4-6F175D3DCCD1}">
+              <a14:hiddenFill xmlns:a14="http://schemas.microsoft.com/office/drawing/2010/main">
+                <a:solidFill>
+                  <a:srgbClr val="FFFFFF"/>
+                </a:solidFill>
+              </a14:hiddenFill>
+            </a:ext>
+          </a:extLst>
+        </p:spPr>
+      </p:pic>
+      <p:sp>
+        <p:nvSpPr>
+          <p:cNvPr id="12" name="TextBox 11"/>
+          <p:cNvSpPr txBox="1"/>
+          <p:nvPr/>
+        </p:nvSpPr>
+        <p:spPr>
+          <a:xfrm>
+            <a:off x="2372135" y="3484433"/>
+            <a:ext cx="1165191" cy="646331"/>
+          </a:xfrm>
+          <a:prstGeom prst="rect">
+            <a:avLst/>
+          </a:prstGeom>
+          <a:noFill/>
+        </p:spPr>
+        <p:txBody>
+          <a:bodyPr wrap="none" rtlCol="0">
+            <a:spAutoFit/>
+          </a:bodyPr>
+          <a:lstStyle/>
+          <a:p>
+            <a:r>
+              <a:rPr lang="en-GB" dirty="0" smtClean="0"/>
+              <a:t>(Invoice)</a:t>
+            </a:r>
+          </a:p>
+          <a:p>
+            <a:r>
+              <a:rPr lang="en-GB" dirty="0" smtClean="0"/>
+              <a:t>Document</a:t>
+            </a:r>
+            <a:endParaRPr lang="en-GB" dirty="0"/>
+          </a:p>
+        </p:txBody>
+      </p:sp>
+      <p:pic>
+        <p:nvPicPr>
+          <p:cNvPr id="13" name="Picture 3" descr="C:\GITHUB\incodehq\incode-module-document\dom\src\main\java\org\incode\module\document\dom\impl\docs\Document-pdf.png"/>
+          <p:cNvPicPr>
+            <a:picLocks noChangeAspect="1" noChangeArrowheads="1"/>
+          </p:cNvPicPr>
+          <p:nvPr/>
+        </p:nvPicPr>
+        <p:blipFill>
+          <a:blip r:embed="rId3">
+            <a:extLst>
+              <a:ext uri="{28A0092B-C50C-407E-A947-70E740481C1C}">
+                <a14:useLocalDpi xmlns:a14="http://schemas.microsoft.com/office/drawing/2010/main" val="0"/>
+              </a:ext>
+            </a:extLst>
+          </a:blip>
+          <a:srcRect/>
+          <a:stretch>
+            <a:fillRect/>
+          </a:stretch>
+        </p:blipFill>
+        <p:spPr bwMode="auto">
+          <a:xfrm>
+            <a:off x="827584" y="4785735"/>
+            <a:ext cx="916260" cy="916260"/>
+          </a:xfrm>
+          <a:prstGeom prst="rect">
+            <a:avLst/>
+          </a:prstGeom>
+          <a:noFill/>
+          <a:extLst>
+            <a:ext uri="{909E8E84-426E-40DD-AFC4-6F175D3DCCD1}">
+              <a14:hiddenFill xmlns:a14="http://schemas.microsoft.com/office/drawing/2010/main">
+                <a:solidFill>
+                  <a:srgbClr val="FFFFFF"/>
+                </a:solidFill>
+              </a14:hiddenFill>
+            </a:ext>
+          </a:extLst>
+        </p:spPr>
+      </p:pic>
+      <p:sp>
+        <p:nvSpPr>
+          <p:cNvPr id="14" name="TextBox 13"/>
+          <p:cNvSpPr txBox="1"/>
+          <p:nvPr/>
+        </p:nvSpPr>
+        <p:spPr>
+          <a:xfrm>
+            <a:off x="715951" y="5733913"/>
+            <a:ext cx="1337097" cy="646331"/>
+          </a:xfrm>
+          <a:prstGeom prst="rect">
+            <a:avLst/>
+          </a:prstGeom>
+          <a:noFill/>
+        </p:spPr>
+        <p:txBody>
+          <a:bodyPr wrap="none" rtlCol="0">
+            <a:spAutoFit/>
+          </a:bodyPr>
+          <a:lstStyle/>
+          <a:p>
+            <a:pPr algn="ctr"/>
+            <a:r>
+              <a:rPr lang="en-GB" dirty="0" smtClean="0"/>
+              <a:t>(Tax receipt)</a:t>
+            </a:r>
+          </a:p>
+          <a:p>
+            <a:pPr algn="ctr"/>
+            <a:r>
+              <a:rPr lang="en-GB" dirty="0" smtClean="0"/>
+              <a:t>Document</a:t>
+            </a:r>
+            <a:endParaRPr lang="en-GB" dirty="0"/>
+          </a:p>
+        </p:txBody>
+      </p:sp>
+      <p:pic>
+        <p:nvPicPr>
+          <p:cNvPr id="1028" name="Picture 4" descr="C:\GITHUB\incodehq\incode-module-document\dom\src\main\java\org\incode\module\document\dom\impl\paperclips\Paperclip.png"/>
+          <p:cNvPicPr>
+            <a:picLocks noChangeAspect="1" noChangeArrowheads="1"/>
+          </p:cNvPicPr>
+          <p:nvPr/>
+        </p:nvPicPr>
+        <p:blipFill>
+          <a:blip r:embed="rId4">
+            <a:extLst>
+              <a:ext uri="{28A0092B-C50C-407E-A947-70E740481C1C}">
+                <a14:useLocalDpi xmlns:a14="http://schemas.microsoft.com/office/drawing/2010/main" val="0"/>
+              </a:ext>
+            </a:extLst>
+          </a:blip>
+          <a:srcRect/>
+          <a:stretch>
+            <a:fillRect/>
+          </a:stretch>
+        </p:blipFill>
+        <p:spPr bwMode="auto">
+          <a:xfrm>
+            <a:off x="1331640" y="1667682"/>
+            <a:ext cx="518865" cy="518865"/>
+          </a:xfrm>
+          <a:prstGeom prst="rect">
+            <a:avLst/>
+          </a:prstGeom>
+          <a:noFill/>
+          <a:extLst>
+            <a:ext uri="{909E8E84-426E-40DD-AFC4-6F175D3DCCD1}">
+              <a14:hiddenFill xmlns:a14="http://schemas.microsoft.com/office/drawing/2010/main">
+                <a:solidFill>
+                  <a:srgbClr val="FFFFFF"/>
+                </a:solidFill>
+              </a14:hiddenFill>
+            </a:ext>
+          </a:extLst>
+        </p:spPr>
+      </p:pic>
+      <p:cxnSp>
+        <p:nvCxnSpPr>
+          <p:cNvPr id="11" name="Straight Connector 10"/>
+          <p:cNvCxnSpPr/>
+          <p:nvPr/>
+        </p:nvCxnSpPr>
+        <p:spPr>
+          <a:xfrm>
+            <a:off x="1074830" y="1387561"/>
+            <a:ext cx="1048898" cy="1015011"/>
+          </a:xfrm>
+          <a:prstGeom prst="line">
+            <a:avLst/>
+          </a:prstGeom>
+        </p:spPr>
+        <p:style>
+          <a:lnRef idx="1">
+            <a:schemeClr val="accent1"/>
+          </a:lnRef>
+          <a:fillRef idx="0">
+            <a:schemeClr val="accent1"/>
+          </a:fillRef>
+          <a:effectRef idx="0">
+            <a:schemeClr val="accent1"/>
+          </a:effectRef>
+          <a:fontRef idx="minor">
+            <a:schemeClr val="tx1"/>
+          </a:fontRef>
+        </p:style>
+      </p:cxnSp>
+      <p:pic>
+        <p:nvPicPr>
+          <p:cNvPr id="20" name="Picture 4" descr="C:\GITHUB\incodehq\incode-module-document\dom\src\main\java\org\incode\module\document\dom\impl\paperclips\Paperclip.png"/>
+          <p:cNvPicPr>
+            <a:picLocks noChangeAspect="1" noChangeArrowheads="1"/>
+          </p:cNvPicPr>
+          <p:nvPr/>
+        </p:nvPicPr>
+        <p:blipFill>
+          <a:blip r:embed="rId4">
+            <a:extLst>
+              <a:ext uri="{28A0092B-C50C-407E-A947-70E740481C1C}">
+                <a14:useLocalDpi xmlns:a14="http://schemas.microsoft.com/office/drawing/2010/main" val="0"/>
+              </a:ext>
+            </a:extLst>
+          </a:blip>
+          <a:srcRect/>
+          <a:stretch>
+            <a:fillRect/>
+          </a:stretch>
+        </p:blipFill>
+        <p:spPr bwMode="auto">
+          <a:xfrm>
+            <a:off x="1619505" y="3906829"/>
+            <a:ext cx="518865" cy="518865"/>
+          </a:xfrm>
+          <a:prstGeom prst="rect">
+            <a:avLst/>
+          </a:prstGeom>
+          <a:noFill/>
+          <a:extLst>
+            <a:ext uri="{909E8E84-426E-40DD-AFC4-6F175D3DCCD1}">
+              <a14:hiddenFill xmlns:a14="http://schemas.microsoft.com/office/drawing/2010/main">
+                <a:solidFill>
+                  <a:srgbClr val="FFFFFF"/>
+                </a:solidFill>
+              </a14:hiddenFill>
+            </a:ext>
+          </a:extLst>
+        </p:spPr>
+      </p:pic>
+      <p:cxnSp>
+        <p:nvCxnSpPr>
+          <p:cNvPr id="21" name="Straight Connector 20"/>
+          <p:cNvCxnSpPr/>
+          <p:nvPr/>
+        </p:nvCxnSpPr>
+        <p:spPr>
+          <a:xfrm flipH="1">
+            <a:off x="1362695" y="3626708"/>
+            <a:ext cx="1048898" cy="1015011"/>
+          </a:xfrm>
+          <a:prstGeom prst="line">
+            <a:avLst/>
+          </a:prstGeom>
+        </p:spPr>
+        <p:style>
+          <a:lnRef idx="1">
+            <a:schemeClr val="accent1"/>
+          </a:lnRef>
+          <a:fillRef idx="0">
+            <a:schemeClr val="accent1"/>
+          </a:fillRef>
+          <a:effectRef idx="0">
+            <a:schemeClr val="accent1"/>
+          </a:effectRef>
+          <a:fontRef idx="minor">
+            <a:schemeClr val="tx1"/>
+          </a:fontRef>
+        </p:style>
+      </p:cxnSp>
+      <p:pic>
+        <p:nvPicPr>
+          <p:cNvPr id="1029" name="Picture 5" descr="C:\GITHUB\incodehq\incode-module-communications\module\src\main\java\org\incode\module\communications\dom\impl\comms\Communication-email.png"/>
+          <p:cNvPicPr>
+            <a:picLocks noChangeAspect="1" noChangeArrowheads="1"/>
+          </p:cNvPicPr>
+          <p:nvPr/>
+        </p:nvPicPr>
+        <p:blipFill>
+          <a:blip r:embed="rId5">
+            <a:extLst>
+              <a:ext uri="{28A0092B-C50C-407E-A947-70E740481C1C}">
+                <a14:useLocalDpi xmlns:a14="http://schemas.microsoft.com/office/drawing/2010/main" val="0"/>
+              </a:ext>
+            </a:extLst>
+          </a:blip>
+          <a:srcRect/>
+          <a:stretch>
+            <a:fillRect/>
+          </a:stretch>
+        </p:blipFill>
+        <p:spPr bwMode="auto">
+          <a:xfrm>
+            <a:off x="6732240" y="2449322"/>
+            <a:ext cx="1163127" cy="1163127"/>
+          </a:xfrm>
+          <a:prstGeom prst="rect">
+            <a:avLst/>
+          </a:prstGeom>
+          <a:noFill/>
+          <a:extLst>
+            <a:ext uri="{909E8E84-426E-40DD-AFC4-6F175D3DCCD1}">
+              <a14:hiddenFill xmlns:a14="http://schemas.microsoft.com/office/drawing/2010/main">
+                <a:solidFill>
+                  <a:srgbClr val="FFFFFF"/>
+                </a:solidFill>
+              </a14:hiddenFill>
+            </a:ext>
+          </a:extLst>
+        </p:spPr>
+      </p:pic>
+      <p:sp>
+        <p:nvSpPr>
+          <p:cNvPr id="24" name="TextBox 23"/>
+          <p:cNvSpPr txBox="1"/>
+          <p:nvPr/>
+        </p:nvSpPr>
+        <p:spPr>
+          <a:xfrm>
+            <a:off x="6643394" y="3410684"/>
+            <a:ext cx="1673022" cy="646331"/>
+          </a:xfrm>
+          <a:prstGeom prst="rect">
+            <a:avLst/>
+          </a:prstGeom>
+          <a:noFill/>
+        </p:spPr>
+        <p:txBody>
+          <a:bodyPr wrap="none" rtlCol="0">
+            <a:spAutoFit/>
+          </a:bodyPr>
+          <a:lstStyle/>
+          <a:p>
+            <a:r>
+              <a:rPr lang="en-GB" dirty="0" smtClean="0"/>
+              <a:t>(Email)</a:t>
+            </a:r>
+          </a:p>
+          <a:p>
+            <a:r>
+              <a:rPr lang="en-GB" dirty="0" smtClean="0"/>
+              <a:t>Communication</a:t>
+            </a:r>
+            <a:endParaRPr lang="en-GB" dirty="0"/>
+          </a:p>
+        </p:txBody>
+      </p:sp>
+      <p:pic>
+        <p:nvPicPr>
+          <p:cNvPr id="1030" name="Picture 6" descr="C:\GITHUB\incodehq\incode-module-document\dom\src\main\java\org\incode\module\document\dom\impl\docs\Document-html.png"/>
+          <p:cNvPicPr>
+            <a:picLocks noChangeAspect="1" noChangeArrowheads="1"/>
+          </p:cNvPicPr>
+          <p:nvPr/>
+        </p:nvPicPr>
+        <p:blipFill>
+          <a:blip r:embed="rId6">
+            <a:extLst>
+              <a:ext uri="{28A0092B-C50C-407E-A947-70E740481C1C}">
+                <a14:useLocalDpi xmlns:a14="http://schemas.microsoft.com/office/drawing/2010/main" val="0"/>
+              </a:ext>
+            </a:extLst>
+          </a:blip>
+          <a:srcRect/>
+          <a:stretch>
+            <a:fillRect/>
+          </a:stretch>
+        </p:blipFill>
+        <p:spPr bwMode="auto">
+          <a:xfrm>
+            <a:off x="4716016" y="4811548"/>
+            <a:ext cx="831384" cy="831384"/>
+          </a:xfrm>
+          <a:prstGeom prst="rect">
+            <a:avLst/>
+          </a:prstGeom>
+          <a:noFill/>
+          <a:extLst>
+            <a:ext uri="{909E8E84-426E-40DD-AFC4-6F175D3DCCD1}">
+              <a14:hiddenFill xmlns:a14="http://schemas.microsoft.com/office/drawing/2010/main">
+                <a:solidFill>
+                  <a:srgbClr val="FFFFFF"/>
+                </a:solidFill>
+              </a14:hiddenFill>
+            </a:ext>
+          </a:extLst>
+        </p:spPr>
+      </p:pic>
+      <p:sp>
+        <p:nvSpPr>
+          <p:cNvPr id="26" name="TextBox 25"/>
+          <p:cNvSpPr txBox="1"/>
+          <p:nvPr/>
+        </p:nvSpPr>
+        <p:spPr>
+          <a:xfrm>
+            <a:off x="4244343" y="5644673"/>
+            <a:ext cx="1892185" cy="646331"/>
+          </a:xfrm>
+          <a:prstGeom prst="rect">
+            <a:avLst/>
+          </a:prstGeom>
+          <a:noFill/>
+        </p:spPr>
+        <p:txBody>
+          <a:bodyPr wrap="none" rtlCol="0">
+            <a:spAutoFit/>
+          </a:bodyPr>
+          <a:lstStyle/>
+          <a:p>
+            <a:pPr algn="ctr"/>
+            <a:r>
+              <a:rPr lang="en-GB" dirty="0" smtClean="0"/>
+              <a:t>(Email cover note)</a:t>
+            </a:r>
+          </a:p>
+          <a:p>
+            <a:pPr algn="ctr"/>
+            <a:r>
+              <a:rPr lang="en-GB" dirty="0" smtClean="0"/>
+              <a:t>Document</a:t>
+            </a:r>
+            <a:endParaRPr lang="en-GB" dirty="0"/>
+          </a:p>
+        </p:txBody>
+      </p:sp>
+      <p:pic>
+        <p:nvPicPr>
+          <p:cNvPr id="27" name="Picture 4" descr="C:\GITHUB\incodehq\incode-module-document\dom\src\main\java\org\incode\module\document\dom\impl\paperclips\Paperclip.png"/>
+          <p:cNvPicPr>
+            <a:picLocks noChangeAspect="1" noChangeArrowheads="1"/>
+          </p:cNvPicPr>
+          <p:nvPr/>
+        </p:nvPicPr>
+        <p:blipFill>
+          <a:blip r:embed="rId4">
+            <a:extLst>
+              <a:ext uri="{28A0092B-C50C-407E-A947-70E740481C1C}">
+                <a14:useLocalDpi xmlns:a14="http://schemas.microsoft.com/office/drawing/2010/main" val="0"/>
+              </a:ext>
+            </a:extLst>
+          </a:blip>
+          <a:srcRect/>
+          <a:stretch>
+            <a:fillRect/>
+          </a:stretch>
+        </p:blipFill>
+        <p:spPr bwMode="auto">
+          <a:xfrm>
+            <a:off x="4460367" y="2766119"/>
+            <a:ext cx="518865" cy="518865"/>
+          </a:xfrm>
+          <a:prstGeom prst="rect">
+            <a:avLst/>
+          </a:prstGeom>
+          <a:noFill/>
+          <a:extLst>
+            <a:ext uri="{909E8E84-426E-40DD-AFC4-6F175D3DCCD1}">
+              <a14:hiddenFill xmlns:a14="http://schemas.microsoft.com/office/drawing/2010/main">
+                <a:solidFill>
+                  <a:srgbClr val="FFFFFF"/>
+                </a:solidFill>
+              </a14:hiddenFill>
+            </a:ext>
+          </a:extLst>
+        </p:spPr>
+      </p:pic>
+      <p:cxnSp>
+        <p:nvCxnSpPr>
+          <p:cNvPr id="29" name="Straight Connector 28"/>
+          <p:cNvCxnSpPr/>
+          <p:nvPr/>
+        </p:nvCxnSpPr>
+        <p:spPr>
+          <a:xfrm>
+            <a:off x="1227230" y="1539961"/>
+            <a:ext cx="1048898" cy="1015011"/>
+          </a:xfrm>
+          <a:prstGeom prst="line">
+            <a:avLst/>
+          </a:prstGeom>
+        </p:spPr>
+        <p:style>
+          <a:lnRef idx="1">
+            <a:schemeClr val="accent1"/>
+          </a:lnRef>
+          <a:fillRef idx="0">
+            <a:schemeClr val="accent1"/>
+          </a:fillRef>
+          <a:effectRef idx="0">
+            <a:schemeClr val="accent1"/>
+          </a:effectRef>
+          <a:fontRef idx="minor">
+            <a:schemeClr val="tx1"/>
+          </a:fontRef>
+        </p:style>
+      </p:cxnSp>
+      <p:cxnSp>
+        <p:nvCxnSpPr>
+          <p:cNvPr id="30" name="Straight Connector 29"/>
+          <p:cNvCxnSpPr/>
+          <p:nvPr/>
+        </p:nvCxnSpPr>
+        <p:spPr>
+          <a:xfrm>
+            <a:off x="3380247" y="3004718"/>
+            <a:ext cx="3096344" cy="26167"/>
+          </a:xfrm>
+          <a:prstGeom prst="line">
+            <a:avLst/>
+          </a:prstGeom>
+        </p:spPr>
+        <p:style>
+          <a:lnRef idx="1">
+            <a:schemeClr val="accent1"/>
+          </a:lnRef>
+          <a:fillRef idx="0">
+            <a:schemeClr val="accent1"/>
+          </a:fillRef>
+          <a:effectRef idx="0">
+            <a:schemeClr val="accent1"/>
+          </a:effectRef>
+          <a:fontRef idx="minor">
+            <a:schemeClr val="tx1"/>
+          </a:fontRef>
+        </p:style>
+      </p:cxnSp>
+      <p:pic>
+        <p:nvPicPr>
+          <p:cNvPr id="33" name="Picture 4" descr="C:\GITHUB\incodehq\incode-module-document\dom\src\main\java\org\incode\module\document\dom\impl\paperclips\Paperclip.png"/>
+          <p:cNvPicPr>
+            <a:picLocks noChangeAspect="1" noChangeArrowheads="1"/>
+          </p:cNvPicPr>
+          <p:nvPr/>
+        </p:nvPicPr>
+        <p:blipFill>
+          <a:blip r:embed="rId4">
+            <a:extLst>
+              <a:ext uri="{28A0092B-C50C-407E-A947-70E740481C1C}">
+                <a14:useLocalDpi xmlns:a14="http://schemas.microsoft.com/office/drawing/2010/main" val="0"/>
+              </a:ext>
+            </a:extLst>
+          </a:blip>
+          <a:srcRect/>
+          <a:stretch>
+            <a:fillRect/>
+          </a:stretch>
+        </p:blipFill>
+        <p:spPr bwMode="auto">
+          <a:xfrm>
+            <a:off x="5813710" y="3933056"/>
+            <a:ext cx="518865" cy="518865"/>
+          </a:xfrm>
+          <a:prstGeom prst="rect">
+            <a:avLst/>
+          </a:prstGeom>
+          <a:noFill/>
+          <a:extLst>
+            <a:ext uri="{909E8E84-426E-40DD-AFC4-6F175D3DCCD1}">
+              <a14:hiddenFill xmlns:a14="http://schemas.microsoft.com/office/drawing/2010/main">
+                <a:solidFill>
+                  <a:srgbClr val="FFFFFF"/>
+                </a:solidFill>
+              </a14:hiddenFill>
+            </a:ext>
+          </a:extLst>
+        </p:spPr>
+      </p:pic>
+      <p:cxnSp>
+        <p:nvCxnSpPr>
+          <p:cNvPr id="35" name="Straight Connector 34"/>
+          <p:cNvCxnSpPr/>
+          <p:nvPr/>
+        </p:nvCxnSpPr>
+        <p:spPr>
+          <a:xfrm flipH="1">
+            <a:off x="5571709" y="3638125"/>
+            <a:ext cx="1048898" cy="1015011"/>
+          </a:xfrm>
+          <a:prstGeom prst="line">
+            <a:avLst/>
+          </a:prstGeom>
+        </p:spPr>
+        <p:style>
+          <a:lnRef idx="1">
+            <a:schemeClr val="accent1"/>
+          </a:lnRef>
+          <a:fillRef idx="0">
+            <a:schemeClr val="accent1"/>
+          </a:fillRef>
+          <a:effectRef idx="0">
+            <a:schemeClr val="accent1"/>
+          </a:effectRef>
+          <a:fontRef idx="minor">
+            <a:schemeClr val="tx1"/>
+          </a:fontRef>
+        </p:style>
+      </p:cxnSp>
+      <p:pic>
+        <p:nvPicPr>
+          <p:cNvPr id="25" name="Picture 4" descr="C:\GITHUB\incodehq\incode-module-document\dom\src\main\java\org\incode\module\document\dom\impl\paperclips\Paperclip.png"/>
+          <p:cNvPicPr>
+            <a:picLocks noChangeAspect="1" noChangeArrowheads="1"/>
+          </p:cNvPicPr>
+          <p:nvPr/>
+        </p:nvPicPr>
+        <p:blipFill>
+          <a:blip r:embed="rId4">
+            <a:extLst>
+              <a:ext uri="{28A0092B-C50C-407E-A947-70E740481C1C}">
+                <a14:useLocalDpi xmlns:a14="http://schemas.microsoft.com/office/drawing/2010/main" val="0"/>
+              </a:ext>
+            </a:extLst>
+          </a:blip>
+          <a:srcRect/>
+          <a:stretch>
+            <a:fillRect/>
+          </a:stretch>
+        </p:blipFill>
+        <p:spPr bwMode="auto">
+          <a:xfrm>
+            <a:off x="3596601" y="4206279"/>
+            <a:ext cx="518865" cy="518865"/>
+          </a:xfrm>
+          <a:prstGeom prst="rect">
+            <a:avLst/>
+          </a:prstGeom>
+          <a:noFill/>
+          <a:extLst>
+            <a:ext uri="{909E8E84-426E-40DD-AFC4-6F175D3DCCD1}">
+              <a14:hiddenFill xmlns:a14="http://schemas.microsoft.com/office/drawing/2010/main">
+                <a:solidFill>
+                  <a:srgbClr val="FFFFFF"/>
+                </a:solidFill>
+              </a14:hiddenFill>
+            </a:ext>
+          </a:extLst>
+        </p:spPr>
+      </p:pic>
+      <p:cxnSp>
+        <p:nvCxnSpPr>
+          <p:cNvPr id="32" name="Straight Connector 31"/>
+          <p:cNvCxnSpPr/>
+          <p:nvPr/>
+        </p:nvCxnSpPr>
+        <p:spPr>
+          <a:xfrm flipV="1">
+            <a:off x="2053048" y="3337233"/>
+            <a:ext cx="4391160" cy="1890007"/>
+          </a:xfrm>
+          <a:prstGeom prst="line">
+            <a:avLst/>
+          </a:prstGeom>
+        </p:spPr>
+        <p:style>
+          <a:lnRef idx="1">
+            <a:schemeClr val="accent1"/>
+          </a:lnRef>
+          <a:fillRef idx="0">
+            <a:schemeClr val="accent1"/>
+          </a:fillRef>
+          <a:effectRef idx="0">
+            <a:schemeClr val="accent1"/>
+          </a:effectRef>
+          <a:fontRef idx="minor">
+            <a:schemeClr val="tx1"/>
+          </a:fontRef>
+        </p:style>
+      </p:cxnSp>
+      <p:sp>
+        <p:nvSpPr>
+          <p:cNvPr id="36" name="TextBox 35"/>
+          <p:cNvSpPr txBox="1"/>
+          <p:nvPr/>
+        </p:nvSpPr>
+        <p:spPr>
+          <a:xfrm>
+            <a:off x="3203848" y="188640"/>
+            <a:ext cx="3181640" cy="646331"/>
+          </a:xfrm>
+          <a:prstGeom prst="rect">
+            <a:avLst/>
+          </a:prstGeom>
+          <a:noFill/>
+        </p:spPr>
+        <p:txBody>
+          <a:bodyPr wrap="none" rtlCol="0">
+            <a:spAutoFit/>
+          </a:bodyPr>
+          <a:lstStyle/>
+          <a:p>
+            <a:r>
+              <a:rPr lang="en-GB" sz="3600" dirty="0" smtClean="0">
+                <a:solidFill>
+                  <a:srgbClr val="00B050"/>
+                </a:solidFill>
+              </a:rPr>
+              <a:t>“Send by Email”</a:t>
+            </a:r>
+            <a:endParaRPr lang="en-GB" sz="3600" dirty="0">
+              <a:solidFill>
+                <a:srgbClr val="00B050"/>
+              </a:solidFill>
+            </a:endParaRPr>
+          </a:p>
+        </p:txBody>
+      </p:sp>
+      <p:pic>
+        <p:nvPicPr>
+          <p:cNvPr id="28" name="Picture 4" descr="C:\GITHUB\incodehq\incode-module-document\dom\src\main\java\org\incode\module\document\dom\impl\paperclips\Paperclip.png"/>
+          <p:cNvPicPr>
+            <a:picLocks noChangeAspect="1" noChangeArrowheads="1"/>
+          </p:cNvPicPr>
+          <p:nvPr/>
+        </p:nvPicPr>
+        <p:blipFill>
+          <a:blip r:embed="rId4">
+            <a:extLst>
+              <a:ext uri="{28A0092B-C50C-407E-A947-70E740481C1C}">
+                <a14:useLocalDpi xmlns:a14="http://schemas.microsoft.com/office/drawing/2010/main" val="0"/>
+              </a:ext>
+            </a:extLst>
+          </a:blip>
+          <a:srcRect/>
+          <a:stretch>
+            <a:fillRect/>
+          </a:stretch>
+        </p:blipFill>
+        <p:spPr bwMode="auto">
+          <a:xfrm>
+            <a:off x="780858" y="2767814"/>
+            <a:ext cx="518865" cy="518865"/>
+          </a:xfrm>
+          <a:prstGeom prst="rect">
+            <a:avLst/>
+          </a:prstGeom>
+          <a:noFill/>
+          <a:extLst>
+            <a:ext uri="{909E8E84-426E-40DD-AFC4-6F175D3DCCD1}">
+              <a14:hiddenFill xmlns:a14="http://schemas.microsoft.com/office/drawing/2010/main">
+                <a:solidFill>
+                  <a:srgbClr val="FFFFFF"/>
+                </a:solidFill>
+              </a14:hiddenFill>
+            </a:ext>
+          </a:extLst>
+        </p:spPr>
+      </p:pic>
+      <p:cxnSp>
+        <p:nvCxnSpPr>
+          <p:cNvPr id="31" name="Straight Connector 30"/>
+          <p:cNvCxnSpPr/>
+          <p:nvPr/>
+        </p:nvCxnSpPr>
+        <p:spPr>
+          <a:xfrm>
+            <a:off x="827584" y="1412776"/>
+            <a:ext cx="535111" cy="3228943"/>
+          </a:xfrm>
+          <a:prstGeom prst="line">
+            <a:avLst/>
+          </a:prstGeom>
+        </p:spPr>
+        <p:style>
+          <a:lnRef idx="1">
+            <a:schemeClr val="accent1"/>
+          </a:lnRef>
+          <a:fillRef idx="0">
+            <a:schemeClr val="accent1"/>
+          </a:fillRef>
+          <a:effectRef idx="0">
+            <a:schemeClr val="accent1"/>
+          </a:effectRef>
+          <a:fontRef idx="minor">
+            <a:schemeClr val="tx1"/>
+          </a:fontRef>
+        </p:style>
+      </p:cxnSp>
+    </p:spTree>
+    <p:extLst>
+      <p:ext uri="{BB962C8B-B14F-4D97-AF65-F5344CB8AC3E}">
+        <p14:creationId xmlns:p14="http://schemas.microsoft.com/office/powerpoint/2010/main" val="652227335"/>
+      </p:ext>
+    </p:extLst>
+  </p:cSld>
+  <p:clrMapOvr>
+    <a:masterClrMapping/>
+  </p:clrMapOvr>
+  <p:timing>
+    <p:tnLst>
+      <p:par>
+        <p:cTn id="1" dur="indefinite" restart="never" nodeType="tmRoot"/>
+      </p:par>
+    </p:tnLst>
+  </p:timing>
 </p:sld>
 </file>
 
@@ -4740,23 +8567,7 @@
                   <a:srgbClr val="0070C0"/>
                 </a:solidFill>
               </a:rPr>
-              <a:t>“</a:t>
-            </a:r>
-            <a:r>
-              <a:rPr lang="en-GB" sz="3600" dirty="0" smtClean="0">
-                <a:solidFill>
-                  <a:srgbClr val="0070C0"/>
-                </a:solidFill>
-              </a:rPr>
-              <a:t>Prelim - </a:t>
-            </a:r>
-            <a:r>
-              <a:rPr lang="en-GB" sz="3600" dirty="0" smtClean="0">
-                <a:solidFill>
-                  <a:srgbClr val="0070C0"/>
-                </a:solidFill>
-              </a:rPr>
-              <a:t>Send by Post”</a:t>
+              <a:t>“Prelim - Send by Post”</a:t>
             </a:r>
             <a:endParaRPr lang="en-GB" sz="3600" dirty="0">
               <a:solidFill>
@@ -5371,23 +9182,7 @@
                   <a:srgbClr val="0070C0"/>
                 </a:solidFill>
               </a:rPr>
-              <a:t>“</a:t>
-            </a:r>
-            <a:r>
-              <a:rPr lang="en-GB" sz="3600" dirty="0" smtClean="0">
-                <a:solidFill>
-                  <a:srgbClr val="0070C0"/>
-                </a:solidFill>
-              </a:rPr>
-              <a:t>Prelim - </a:t>
-            </a:r>
-            <a:r>
-              <a:rPr lang="en-GB" sz="3600" dirty="0" smtClean="0">
-                <a:solidFill>
-                  <a:srgbClr val="0070C0"/>
-                </a:solidFill>
-              </a:rPr>
-              <a:t>Send by Email”</a:t>
+              <a:t>“Prelim - Send by Email”</a:t>
             </a:r>
             <a:endParaRPr lang="en-GB" sz="3600" dirty="0">
               <a:solidFill>
@@ -6175,27 +9970,7 @@
                   </a:schemeClr>
                 </a:solidFill>
               </a:rPr>
-              <a:t>“</a:t>
-            </a:r>
-            <a:r>
-              <a:rPr lang="en-GB" sz="3600" dirty="0" smtClean="0">
-                <a:solidFill>
-                  <a:schemeClr val="accent6">
-                    <a:lumMod val="75000"/>
-                  </a:schemeClr>
-                </a:solidFill>
-              </a:rPr>
-              <a:t>Invoice - </a:t>
-            </a:r>
-            <a:r>
-              <a:rPr lang="en-GB" sz="3600" dirty="0" smtClean="0">
-                <a:solidFill>
-                  <a:schemeClr val="accent6">
-                    <a:lumMod val="75000"/>
-                  </a:schemeClr>
-                </a:solidFill>
-              </a:rPr>
-              <a:t>Send by Post”</a:t>
+              <a:t>“Invoice - Send by Post”</a:t>
             </a:r>
             <a:endParaRPr lang="en-GB" sz="3600" dirty="0">
               <a:solidFill>
@@ -6217,6 +9992,13 @@
   <p:clrMapOvr>
     <a:masterClrMapping/>
   </p:clrMapOvr>
+  <p:timing>
+    <p:tnLst>
+      <p:par>
+        <p:cTn id="1" dur="indefinite" restart="never" nodeType="tmRoot"/>
+      </p:par>
+    </p:tnLst>
+  </p:timing>
 </p:sld>
 </file>
 
@@ -6814,27 +10596,7 @@
                   </a:schemeClr>
                 </a:solidFill>
               </a:rPr>
-              <a:t>“</a:t>
-            </a:r>
-            <a:r>
-              <a:rPr lang="en-GB" sz="3600" dirty="0" smtClean="0">
-                <a:solidFill>
-                  <a:schemeClr val="accent6">
-                    <a:lumMod val="75000"/>
-                  </a:schemeClr>
-                </a:solidFill>
-              </a:rPr>
-              <a:t>Invoice - </a:t>
-            </a:r>
-            <a:r>
-              <a:rPr lang="en-GB" sz="3600" dirty="0" smtClean="0">
-                <a:solidFill>
-                  <a:schemeClr val="accent6">
-                    <a:lumMod val="75000"/>
-                  </a:schemeClr>
-                </a:solidFill>
-              </a:rPr>
-              <a:t>Send by Email”</a:t>
+              <a:t>“Invoice - Send by Email”</a:t>
             </a:r>
             <a:endParaRPr lang="en-GB" sz="3600" dirty="0">
               <a:solidFill>
@@ -6856,6 +10618,13 @@
   <p:clrMapOvr>
     <a:masterClrMapping/>
   </p:clrMapOvr>
+  <p:timing>
+    <p:tnLst>
+      <p:par>
+        <p:cTn id="1" dur="indefinite" restart="never" nodeType="tmRoot"/>
+      </p:par>
+    </p:tnLst>
+  </p:timing>
 </p:sld>
 </file>
 
@@ -6947,232 +10716,23 @@
           </a:p>
         </p:txBody>
       </p:sp>
-      <p:pic>
-        <p:nvPicPr>
-          <p:cNvPr id="1027" name="Picture 3" descr="C:\GITHUB\incodehq\incode-module-document\dom\src\main\java\org\incode\module\document\dom\impl\docs\Document-pdf.png"/>
-          <p:cNvPicPr>
-            <a:picLocks noChangeAspect="1" noChangeArrowheads="1"/>
-          </p:cNvPicPr>
-          <p:nvPr/>
-        </p:nvPicPr>
-        <p:blipFill>
-          <a:blip r:embed="rId3">
-            <a:extLst>
-              <a:ext uri="{28A0092B-C50C-407E-A947-70E740481C1C}">
-                <a14:useLocalDpi xmlns:a14="http://schemas.microsoft.com/office/drawing/2010/main" val="0"/>
-              </a:ext>
-            </a:extLst>
-          </a:blip>
-          <a:srcRect/>
-          <a:stretch>
-            <a:fillRect/>
-          </a:stretch>
-        </p:blipFill>
-        <p:spPr bwMode="auto">
-          <a:xfrm>
-            <a:off x="2363960" y="2546588"/>
-            <a:ext cx="916260" cy="916260"/>
-          </a:xfrm>
-          <a:prstGeom prst="rect">
-            <a:avLst/>
-          </a:prstGeom>
-          <a:noFill/>
-          <a:extLst>
-            <a:ext uri="{909E8E84-426E-40DD-AFC4-6F175D3DCCD1}">
-              <a14:hiddenFill xmlns:a14="http://schemas.microsoft.com/office/drawing/2010/main">
-                <a:solidFill>
-                  <a:srgbClr val="FFFFFF"/>
-                </a:solidFill>
-              </a14:hiddenFill>
-            </a:ext>
-          </a:extLst>
-        </p:spPr>
-      </p:pic>
-      <p:sp>
-        <p:nvSpPr>
-          <p:cNvPr id="12" name="TextBox 11"/>
-          <p:cNvSpPr txBox="1"/>
-          <p:nvPr/>
-        </p:nvSpPr>
-        <p:spPr>
-          <a:xfrm>
-            <a:off x="2372135" y="3484433"/>
-            <a:ext cx="1165191" cy="646331"/>
-          </a:xfrm>
-          <a:prstGeom prst="rect">
-            <a:avLst/>
-          </a:prstGeom>
-          <a:noFill/>
-        </p:spPr>
-        <p:txBody>
-          <a:bodyPr wrap="none" rtlCol="0">
-            <a:spAutoFit/>
-          </a:bodyPr>
-          <a:lstStyle/>
-          <a:p>
-            <a:r>
-              <a:rPr lang="en-GB" dirty="0" smtClean="0"/>
-              <a:t>(Invoice)</a:t>
-            </a:r>
-          </a:p>
-          <a:p>
-            <a:r>
-              <a:rPr lang="en-GB" dirty="0" smtClean="0"/>
-              <a:t>Document</a:t>
-            </a:r>
-            <a:endParaRPr lang="en-GB" dirty="0"/>
-          </a:p>
-        </p:txBody>
-      </p:sp>
-      <p:pic>
-        <p:nvPicPr>
-          <p:cNvPr id="1028" name="Picture 4" descr="C:\GITHUB\incodehq\incode-module-document\dom\src\main\java\org\incode\module\document\dom\impl\paperclips\Paperclip.png"/>
-          <p:cNvPicPr>
-            <a:picLocks noChangeAspect="1" noChangeArrowheads="1"/>
-          </p:cNvPicPr>
-          <p:nvPr/>
-        </p:nvPicPr>
-        <p:blipFill>
-          <a:blip r:embed="rId4">
-            <a:extLst>
-              <a:ext uri="{28A0092B-C50C-407E-A947-70E740481C1C}">
-                <a14:useLocalDpi xmlns:a14="http://schemas.microsoft.com/office/drawing/2010/main" val="0"/>
-              </a:ext>
-            </a:extLst>
-          </a:blip>
-          <a:srcRect/>
-          <a:stretch>
-            <a:fillRect/>
-          </a:stretch>
-        </p:blipFill>
-        <p:spPr bwMode="auto">
-          <a:xfrm>
-            <a:off x="1331640" y="1667682"/>
-            <a:ext cx="518865" cy="518865"/>
-          </a:xfrm>
-          <a:prstGeom prst="rect">
-            <a:avLst/>
-          </a:prstGeom>
-          <a:noFill/>
-          <a:extLst>
-            <a:ext uri="{909E8E84-426E-40DD-AFC4-6F175D3DCCD1}">
-              <a14:hiddenFill xmlns:a14="http://schemas.microsoft.com/office/drawing/2010/main">
-                <a:solidFill>
-                  <a:srgbClr val="FFFFFF"/>
-                </a:solidFill>
-              </a14:hiddenFill>
-            </a:ext>
-          </a:extLst>
-        </p:spPr>
-      </p:pic>
-      <p:cxnSp>
-        <p:nvCxnSpPr>
-          <p:cNvPr id="11" name="Straight Connector 10"/>
-          <p:cNvCxnSpPr/>
-          <p:nvPr/>
-        </p:nvCxnSpPr>
-        <p:spPr>
-          <a:xfrm>
-            <a:off x="1074830" y="1387561"/>
-            <a:ext cx="1048898" cy="1015011"/>
-          </a:xfrm>
-          <a:prstGeom prst="line">
-            <a:avLst/>
-          </a:prstGeom>
-        </p:spPr>
-        <p:style>
-          <a:lnRef idx="1">
-            <a:schemeClr val="accent1"/>
-          </a:lnRef>
-          <a:fillRef idx="0">
-            <a:schemeClr val="accent1"/>
-          </a:fillRef>
-          <a:effectRef idx="0">
-            <a:schemeClr val="accent1"/>
-          </a:effectRef>
-          <a:fontRef idx="minor">
-            <a:schemeClr val="tx1"/>
-          </a:fontRef>
-        </p:style>
-      </p:cxnSp>
-      <p:cxnSp>
-        <p:nvCxnSpPr>
-          <p:cNvPr id="29" name="Straight Connector 28"/>
-          <p:cNvCxnSpPr/>
-          <p:nvPr/>
-        </p:nvCxnSpPr>
-        <p:spPr>
-          <a:xfrm>
-            <a:off x="1227230" y="1539961"/>
-            <a:ext cx="1048898" cy="1015011"/>
-          </a:xfrm>
-          <a:prstGeom prst="line">
-            <a:avLst/>
-          </a:prstGeom>
-        </p:spPr>
-        <p:style>
-          <a:lnRef idx="1">
-            <a:schemeClr val="accent1"/>
-          </a:lnRef>
-          <a:fillRef idx="0">
-            <a:schemeClr val="accent1"/>
-          </a:fillRef>
-          <a:effectRef idx="0">
-            <a:schemeClr val="accent1"/>
-          </a:effectRef>
-          <a:fontRef idx="minor">
-            <a:schemeClr val="tx1"/>
-          </a:fontRef>
-        </p:style>
-      </p:cxnSp>
-      <p:sp>
-        <p:nvSpPr>
-          <p:cNvPr id="10" name="TextBox 9"/>
-          <p:cNvSpPr txBox="1"/>
-          <p:nvPr/>
-        </p:nvSpPr>
-        <p:spPr>
-          <a:xfrm>
-            <a:off x="3203848" y="188640"/>
-            <a:ext cx="2041585" cy="646331"/>
-          </a:xfrm>
-          <a:prstGeom prst="rect">
-            <a:avLst/>
-          </a:prstGeom>
-          <a:noFill/>
-        </p:spPr>
-        <p:txBody>
-          <a:bodyPr wrap="none" rtlCol="0">
-            <a:spAutoFit/>
-          </a:bodyPr>
-          <a:lstStyle/>
-          <a:p>
-            <a:r>
-              <a:rPr lang="en-GB" sz="3600" dirty="0" smtClean="0">
-                <a:solidFill>
-                  <a:srgbClr val="00B050"/>
-                </a:solidFill>
-              </a:rPr>
-              <a:t>“Prepare”</a:t>
-            </a:r>
-            <a:endParaRPr lang="en-GB" sz="3600" dirty="0">
-              <a:solidFill>
-                <a:srgbClr val="00B050"/>
-              </a:solidFill>
-            </a:endParaRPr>
-          </a:p>
-        </p:txBody>
-      </p:sp>
     </p:spTree>
     <p:extLst>
       <p:ext uri="{BB962C8B-B14F-4D97-AF65-F5344CB8AC3E}">
-        <p14:creationId xmlns:p14="http://schemas.microsoft.com/office/powerpoint/2010/main" val="3257965985"/>
+        <p14:creationId xmlns:p14="http://schemas.microsoft.com/office/powerpoint/2010/main" val="1357325120"/>
       </p:ext>
     </p:extLst>
   </p:cSld>
   <p:clrMapOvr>
     <a:masterClrMapping/>
   </p:clrMapOvr>
+  <p:timing>
+    <p:tnLst>
+      <p:par>
+        <p:cTn id="1" dur="indefinite" restart="never" nodeType="tmRoot"/>
+      </p:par>
+    </p:tnLst>
+  </p:timing>
 </p:sld>
 </file>
 
@@ -7343,85 +10903,6 @@
       </p:sp>
       <p:pic>
         <p:nvPicPr>
-          <p:cNvPr id="13" name="Picture 3" descr="C:\GITHUB\incodehq\incode-module-document\dom\src\main\java\org\incode\module\document\dom\impl\docs\Document-pdf.png"/>
-          <p:cNvPicPr>
-            <a:picLocks noChangeAspect="1" noChangeArrowheads="1"/>
-          </p:cNvPicPr>
-          <p:nvPr/>
-        </p:nvPicPr>
-        <p:blipFill>
-          <a:blip r:embed="rId3">
-            <a:extLst>
-              <a:ext uri="{28A0092B-C50C-407E-A947-70E740481C1C}">
-                <a14:useLocalDpi xmlns:a14="http://schemas.microsoft.com/office/drawing/2010/main" val="0"/>
-              </a:ext>
-            </a:extLst>
-          </a:blip>
-          <a:srcRect/>
-          <a:stretch>
-            <a:fillRect/>
-          </a:stretch>
-        </p:blipFill>
-        <p:spPr bwMode="auto">
-          <a:xfrm>
-            <a:off x="827584" y="4785735"/>
-            <a:ext cx="916260" cy="916260"/>
-          </a:xfrm>
-          <a:prstGeom prst="rect">
-            <a:avLst/>
-          </a:prstGeom>
-          <a:noFill/>
-          <a:extLst>
-            <a:ext uri="{909E8E84-426E-40DD-AFC4-6F175D3DCCD1}">
-              <a14:hiddenFill xmlns:a14="http://schemas.microsoft.com/office/drawing/2010/main">
-                <a:solidFill>
-                  <a:srgbClr val="FFFFFF"/>
-                </a:solidFill>
-              </a14:hiddenFill>
-            </a:ext>
-          </a:extLst>
-        </p:spPr>
-      </p:pic>
-      <p:sp>
-        <p:nvSpPr>
-          <p:cNvPr id="14" name="TextBox 13"/>
-          <p:cNvSpPr txBox="1"/>
-          <p:nvPr/>
-        </p:nvSpPr>
-        <p:spPr>
-          <a:xfrm>
-            <a:off x="715951" y="5733913"/>
-            <a:ext cx="1337097" cy="646331"/>
-          </a:xfrm>
-          <a:prstGeom prst="rect">
-            <a:avLst/>
-          </a:prstGeom>
-          <a:noFill/>
-        </p:spPr>
-        <p:txBody>
-          <a:bodyPr wrap="none" rtlCol="0">
-            <a:spAutoFit/>
-          </a:bodyPr>
-          <a:lstStyle/>
-          <a:p>
-            <a:pPr algn="ctr"/>
-            <a:r>
-              <a:rPr lang="en-GB" dirty="0" smtClean="0"/>
-              <a:t>(Tax receipt)</a:t>
-            </a:r>
-          </a:p>
-          <a:p>
-            <a:pPr algn="ctr"/>
-            <a:r>
-              <a:rPr lang="en-GB" dirty="0" smtClean="0"/>
-              <a:t>Document</a:t>
-            </a:r>
-            <a:endParaRPr lang="en-GB" dirty="0"/>
-          </a:p>
-        </p:txBody>
-      </p:sp>
-      <p:pic>
-        <p:nvPicPr>
           <p:cNvPr id="1028" name="Picture 4" descr="C:\GITHUB\incodehq\incode-module-document\dom\src\main\java\org\incode\module\document\dom\impl\paperclips\Paperclip.png"/>
           <p:cNvPicPr>
             <a:picLocks noChangeAspect="1" noChangeArrowheads="1"/>
@@ -7491,56 +10972,15 @@
           </a:fontRef>
         </p:style>
       </p:cxnSp>
-      <p:pic>
-        <p:nvPicPr>
-          <p:cNvPr id="20" name="Picture 4" descr="C:\GITHUB\incodehq\incode-module-document\dom\src\main\java\org\incode\module\document\dom\impl\paperclips\Paperclip.png"/>
-          <p:cNvPicPr>
-            <a:picLocks noChangeAspect="1" noChangeArrowheads="1"/>
-          </p:cNvPicPr>
-          <p:nvPr/>
-        </p:nvPicPr>
-        <p:blipFill>
-          <a:blip r:embed="rId4">
-            <a:extLst>
-              <a:ext uri="{28A0092B-C50C-407E-A947-70E740481C1C}">
-                <a14:useLocalDpi xmlns:a14="http://schemas.microsoft.com/office/drawing/2010/main" val="0"/>
-              </a:ext>
-            </a:extLst>
-          </a:blip>
-          <a:srcRect/>
-          <a:stretch>
-            <a:fillRect/>
-          </a:stretch>
-        </p:blipFill>
-        <p:spPr bwMode="auto">
-          <a:xfrm>
-            <a:off x="1619505" y="3906829"/>
-            <a:ext cx="518865" cy="518865"/>
-          </a:xfrm>
-          <a:prstGeom prst="rect">
-            <a:avLst/>
-          </a:prstGeom>
-          <a:noFill/>
-          <a:extLst>
-            <a:ext uri="{909E8E84-426E-40DD-AFC4-6F175D3DCCD1}">
-              <a14:hiddenFill xmlns:a14="http://schemas.microsoft.com/office/drawing/2010/main">
-                <a:solidFill>
-                  <a:srgbClr val="FFFFFF"/>
-                </a:solidFill>
-              </a14:hiddenFill>
-            </a:ext>
-          </a:extLst>
-        </p:spPr>
-      </p:pic>
       <p:cxnSp>
         <p:nvCxnSpPr>
-          <p:cNvPr id="21" name="Straight Connector 20"/>
+          <p:cNvPr id="29" name="Straight Connector 28"/>
           <p:cNvCxnSpPr/>
           <p:nvPr/>
         </p:nvCxnSpPr>
         <p:spPr>
-          <a:xfrm flipH="1">
-            <a:off x="1362695" y="3626708"/>
+          <a:xfrm>
+            <a:off x="1227230" y="1539961"/>
             <a:ext cx="1048898" cy="1015011"/>
           </a:xfrm>
           <a:prstGeom prst="line">
@@ -7562,46 +11002,16 @@
           </a:fontRef>
         </p:style>
       </p:cxnSp>
-      <p:cxnSp>
-        <p:nvCxnSpPr>
-          <p:cNvPr id="29" name="Straight Connector 28"/>
-          <p:cNvCxnSpPr/>
-          <p:nvPr/>
-        </p:nvCxnSpPr>
-        <p:spPr>
-          <a:xfrm>
-            <a:off x="1227230" y="1539961"/>
-            <a:ext cx="1048898" cy="1015011"/>
-          </a:xfrm>
-          <a:prstGeom prst="line">
-            <a:avLst/>
-          </a:prstGeom>
-        </p:spPr>
-        <p:style>
-          <a:lnRef idx="1">
-            <a:schemeClr val="accent1"/>
-          </a:lnRef>
-          <a:fillRef idx="0">
-            <a:schemeClr val="accent1"/>
-          </a:fillRef>
-          <a:effectRef idx="0">
-            <a:schemeClr val="accent1"/>
-          </a:effectRef>
-          <a:fontRef idx="minor">
-            <a:schemeClr val="tx1"/>
-          </a:fontRef>
-        </p:style>
-      </p:cxnSp>
-      <p:sp>
-        <p:nvSpPr>
-          <p:cNvPr id="25" name="TextBox 24"/>
+      <p:sp>
+        <p:nvSpPr>
+          <p:cNvPr id="10" name="TextBox 9"/>
           <p:cNvSpPr txBox="1"/>
           <p:nvPr/>
         </p:nvSpPr>
         <p:spPr>
           <a:xfrm>
             <a:off x="3203848" y="188640"/>
-            <a:ext cx="2583271" cy="646331"/>
+            <a:ext cx="2041585" cy="646331"/>
           </a:xfrm>
           <a:prstGeom prst="rect">
             <a:avLst/>
@@ -7620,7 +11030,7 @@
                   <a:srgbClr val="00B050"/>
                 </a:solidFill>
               </a:rPr>
-              <a:t>“Attach PDF”</a:t>
+              <a:t>“Prepare”</a:t>
             </a:r>
             <a:endParaRPr lang="en-GB" sz="3600" dirty="0">
               <a:solidFill>
@@ -7633,13 +11043,20 @@
     </p:spTree>
     <p:extLst>
       <p:ext uri="{BB962C8B-B14F-4D97-AF65-F5344CB8AC3E}">
-        <p14:creationId xmlns:p14="http://schemas.microsoft.com/office/powerpoint/2010/main" val="3395648477"/>
+        <p14:creationId xmlns:p14="http://schemas.microsoft.com/office/powerpoint/2010/main" val="3257965985"/>
       </p:ext>
     </p:extLst>
   </p:cSld>
   <p:clrMapOvr>
     <a:masterClrMapping/>
   </p:clrMapOvr>
+  <p:timing>
+    <p:tnLst>
+      <p:par>
+        <p:cTn id="1" dur="indefinite" restart="never" nodeType="tmRoot"/>
+      </p:par>
+    </p:tnLst>
+  </p:timing>
 </p:sld>
 </file>
 
@@ -8029,124 +11446,6 @@
           </a:fontRef>
         </p:style>
       </p:cxnSp>
-      <p:pic>
-        <p:nvPicPr>
-          <p:cNvPr id="1029" name="Picture 5" descr="C:\GITHUB\incodehq\incode-module-communications\module\src\main\java\org\incode\module\communications\dom\impl\comms\Communication-email.png"/>
-          <p:cNvPicPr>
-            <a:picLocks noChangeAspect="1" noChangeArrowheads="1"/>
-          </p:cNvPicPr>
-          <p:nvPr/>
-        </p:nvPicPr>
-        <p:blipFill>
-          <a:blip r:embed="rId5">
-            <a:extLst>
-              <a:ext uri="{28A0092B-C50C-407E-A947-70E740481C1C}">
-                <a14:useLocalDpi xmlns:a14="http://schemas.microsoft.com/office/drawing/2010/main" val="0"/>
-              </a:ext>
-            </a:extLst>
-          </a:blip>
-          <a:srcRect/>
-          <a:stretch>
-            <a:fillRect/>
-          </a:stretch>
-        </p:blipFill>
-        <p:spPr bwMode="auto">
-          <a:xfrm>
-            <a:off x="6732240" y="2449322"/>
-            <a:ext cx="1163127" cy="1163127"/>
-          </a:xfrm>
-          <a:prstGeom prst="rect">
-            <a:avLst/>
-          </a:prstGeom>
-          <a:noFill/>
-          <a:extLst>
-            <a:ext uri="{909E8E84-426E-40DD-AFC4-6F175D3DCCD1}">
-              <a14:hiddenFill xmlns:a14="http://schemas.microsoft.com/office/drawing/2010/main">
-                <a:solidFill>
-                  <a:srgbClr val="FFFFFF"/>
-                </a:solidFill>
-              </a14:hiddenFill>
-            </a:ext>
-          </a:extLst>
-        </p:spPr>
-      </p:pic>
-      <p:sp>
-        <p:nvSpPr>
-          <p:cNvPr id="24" name="TextBox 23"/>
-          <p:cNvSpPr txBox="1"/>
-          <p:nvPr/>
-        </p:nvSpPr>
-        <p:spPr>
-          <a:xfrm>
-            <a:off x="6643394" y="3410684"/>
-            <a:ext cx="1673022" cy="646331"/>
-          </a:xfrm>
-          <a:prstGeom prst="rect">
-            <a:avLst/>
-          </a:prstGeom>
-          <a:noFill/>
-        </p:spPr>
-        <p:txBody>
-          <a:bodyPr wrap="none" rtlCol="0">
-            <a:spAutoFit/>
-          </a:bodyPr>
-          <a:lstStyle/>
-          <a:p>
-            <a:r>
-              <a:rPr lang="en-GB" dirty="0" smtClean="0"/>
-              <a:t>(Post)</a:t>
-            </a:r>
-          </a:p>
-          <a:p>
-            <a:r>
-              <a:rPr lang="en-GB" dirty="0" smtClean="0"/>
-              <a:t>Communication</a:t>
-            </a:r>
-            <a:endParaRPr lang="en-GB" dirty="0"/>
-          </a:p>
-        </p:txBody>
-      </p:sp>
-      <p:pic>
-        <p:nvPicPr>
-          <p:cNvPr id="27" name="Picture 4" descr="C:\GITHUB\incodehq\incode-module-document\dom\src\main\java\org\incode\module\document\dom\impl\paperclips\Paperclip.png"/>
-          <p:cNvPicPr>
-            <a:picLocks noChangeAspect="1" noChangeArrowheads="1"/>
-          </p:cNvPicPr>
-          <p:nvPr/>
-        </p:nvPicPr>
-        <p:blipFill>
-          <a:blip r:embed="rId4">
-            <a:extLst>
-              <a:ext uri="{28A0092B-C50C-407E-A947-70E740481C1C}">
-                <a14:useLocalDpi xmlns:a14="http://schemas.microsoft.com/office/drawing/2010/main" val="0"/>
-              </a:ext>
-            </a:extLst>
-          </a:blip>
-          <a:srcRect/>
-          <a:stretch>
-            <a:fillRect/>
-          </a:stretch>
-        </p:blipFill>
-        <p:spPr bwMode="auto">
-          <a:xfrm>
-            <a:off x="4460367" y="2766119"/>
-            <a:ext cx="518865" cy="518865"/>
-          </a:xfrm>
-          <a:prstGeom prst="rect">
-            <a:avLst/>
-          </a:prstGeom>
-          <a:noFill/>
-          <a:extLst>
-            <a:ext uri="{909E8E84-426E-40DD-AFC4-6F175D3DCCD1}">
-              <a14:hiddenFill xmlns:a14="http://schemas.microsoft.com/office/drawing/2010/main">
-                <a:solidFill>
-                  <a:srgbClr val="FFFFFF"/>
-                </a:solidFill>
-              </a14:hiddenFill>
-            </a:ext>
-          </a:extLst>
-        </p:spPr>
-      </p:pic>
       <p:cxnSp>
         <p:nvCxnSpPr>
           <p:cNvPr id="29" name="Straight Connector 28"/>
@@ -8177,117 +11476,16 @@
           </a:fontRef>
         </p:style>
       </p:cxnSp>
-      <p:cxnSp>
-        <p:nvCxnSpPr>
-          <p:cNvPr id="30" name="Straight Connector 29"/>
-          <p:cNvCxnSpPr/>
-          <p:nvPr/>
-        </p:nvCxnSpPr>
-        <p:spPr>
-          <a:xfrm>
-            <a:off x="3380247" y="3004718"/>
-            <a:ext cx="3096344" cy="26167"/>
-          </a:xfrm>
-          <a:prstGeom prst="line">
-            <a:avLst/>
-          </a:prstGeom>
-        </p:spPr>
-        <p:style>
-          <a:lnRef idx="1">
-            <a:schemeClr val="accent1"/>
-          </a:lnRef>
-          <a:fillRef idx="0">
-            <a:schemeClr val="accent1"/>
-          </a:fillRef>
-          <a:effectRef idx="0">
-            <a:schemeClr val="accent1"/>
-          </a:effectRef>
-          <a:fontRef idx="minor">
-            <a:schemeClr val="tx1"/>
-          </a:fontRef>
-        </p:style>
-      </p:cxnSp>
-      <p:pic>
-        <p:nvPicPr>
-          <p:cNvPr id="25" name="Picture 4" descr="C:\GITHUB\incodehq\incode-module-document\dom\src\main\java\org\incode\module\document\dom\impl\paperclips\Paperclip.png"/>
-          <p:cNvPicPr>
-            <a:picLocks noChangeAspect="1" noChangeArrowheads="1"/>
-          </p:cNvPicPr>
-          <p:nvPr/>
-        </p:nvPicPr>
-        <p:blipFill>
-          <a:blip r:embed="rId4">
-            <a:extLst>
-              <a:ext uri="{28A0092B-C50C-407E-A947-70E740481C1C}">
-                <a14:useLocalDpi xmlns:a14="http://schemas.microsoft.com/office/drawing/2010/main" val="0"/>
-              </a:ext>
-            </a:extLst>
-          </a:blip>
-          <a:srcRect/>
-          <a:stretch>
-            <a:fillRect/>
-          </a:stretch>
-        </p:blipFill>
-        <p:spPr bwMode="auto">
-          <a:xfrm>
-            <a:off x="3596601" y="4206279"/>
-            <a:ext cx="518865" cy="518865"/>
-          </a:xfrm>
-          <a:prstGeom prst="rect">
-            <a:avLst/>
-          </a:prstGeom>
-          <a:noFill/>
-          <a:extLst>
-            <a:ext uri="{909E8E84-426E-40DD-AFC4-6F175D3DCCD1}">
-              <a14:hiddenFill xmlns:a14="http://schemas.microsoft.com/office/drawing/2010/main">
-                <a:solidFill>
-                  <a:srgbClr val="FFFFFF"/>
-                </a:solidFill>
-              </a14:hiddenFill>
-            </a:ext>
-          </a:extLst>
-        </p:spPr>
-      </p:pic>
-      <p:cxnSp>
-        <p:nvCxnSpPr>
-          <p:cNvPr id="31" name="Straight Connector 30"/>
-          <p:cNvCxnSpPr/>
-          <p:nvPr/>
-        </p:nvCxnSpPr>
-        <p:spPr>
-          <a:xfrm flipV="1">
-            <a:off x="2053048" y="3337233"/>
-            <a:ext cx="4391160" cy="1890007"/>
-          </a:xfrm>
-          <a:prstGeom prst="line">
-            <a:avLst/>
-          </a:prstGeom>
-        </p:spPr>
-        <p:style>
-          <a:lnRef idx="1">
-            <a:schemeClr val="accent1"/>
-          </a:lnRef>
-          <a:fillRef idx="0">
-            <a:schemeClr val="accent1"/>
-          </a:fillRef>
-          <a:effectRef idx="0">
-            <a:schemeClr val="accent1"/>
-          </a:effectRef>
-          <a:fontRef idx="minor">
-            <a:schemeClr val="tx1"/>
-          </a:fontRef>
-        </p:style>
-      </p:cxnSp>
-      <p:sp>
-        <p:nvSpPr>
-          <p:cNvPr id="32" name="TextBox 31"/>
+      <p:sp>
+        <p:nvSpPr>
+          <p:cNvPr id="25" name="TextBox 24"/>
           <p:cNvSpPr txBox="1"/>
           <p:nvPr/>
         </p:nvSpPr>
         <p:spPr>
           <a:xfrm>
             <a:off x="3203848" y="188640"/>
-            <a:ext cx="2973250" cy="646331"/>
+            <a:ext cx="2583271" cy="646331"/>
           </a:xfrm>
           <a:prstGeom prst="rect">
             <a:avLst/>
@@ -8306,7 +11504,7 @@
                   <a:srgbClr val="00B050"/>
                 </a:solidFill>
               </a:rPr>
-              <a:t>“Send by Post”</a:t>
+              <a:t>“Attach PDF”</a:t>
             </a:r>
             <a:endParaRPr lang="en-GB" sz="3600" dirty="0">
               <a:solidFill>
@@ -8319,13 +11517,20 @@
     </p:spTree>
     <p:extLst>
       <p:ext uri="{BB962C8B-B14F-4D97-AF65-F5344CB8AC3E}">
-        <p14:creationId xmlns:p14="http://schemas.microsoft.com/office/powerpoint/2010/main" val="3079389626"/>
+        <p14:creationId xmlns:p14="http://schemas.microsoft.com/office/powerpoint/2010/main" val="3395648477"/>
       </p:ext>
     </p:extLst>
   </p:cSld>
   <p:clrMapOvr>
     <a:masterClrMapping/>
   </p:clrMapOvr>
+  <p:timing>
+    <p:tnLst>
+      <p:par>
+        <p:cTn id="1" dur="indefinite" restart="never" nodeType="tmRoot"/>
+      </p:par>
+    </p:tnLst>
+  </p:timing>
 </p:sld>
 </file>
 

</xml_diff>